<commit_message>
Moving directories, getting rid of numbers
</commit_message>
<xml_diff>
--- a/Slides/slides1.pptx
+++ b/Slides/slides1.pptx
@@ -265,7 +265,7 @@
           </a:bodyPr>
           <a:p>
             <a:pPr algn="r"/>
-            <a:fld id="{F7C06082-8B1F-4657-8918-ABCA341D5BBD}" type="slidenum">
+            <a:fld id="{13FEBB11-784D-42F2-BF93-D123F3D368D4}" type="slidenum">
               <a:rPr b="0" lang="en-US" sz="1400" spc="-1" strike="noStrike">
                 <a:latin typeface="DejaVu Serif"/>
               </a:rPr>
@@ -309,7 +309,7 @@
         <p:spPr>
           <a:xfrm>
             <a:off x="3900600" y="8831160"/>
-            <a:ext cx="2979000" cy="462960"/>
+            <a:ext cx="2978640" cy="462600"/>
           </a:xfrm>
           <a:custGeom>
             <a:avLst/>
@@ -358,7 +358,7 @@
                 <a:spcPct val="100000"/>
               </a:lnSpc>
             </a:pPr>
-            <a:fld id="{5AE71D17-C60F-4881-A48D-696DEC303C80}" type="slidenum">
+            <a:fld id="{39A0456B-246B-4349-BC16-B67145F6FDBD}" type="slidenum">
               <a:rPr b="0" lang="en-US" sz="1200" spc="-1" strike="noStrike">
                 <a:solidFill>
                   <a:srgbClr val="000000"/>
@@ -386,7 +386,7 @@
         <p:spPr>
           <a:xfrm>
             <a:off x="1117440" y="698400"/>
-            <a:ext cx="4646160" cy="3485520"/>
+            <a:ext cx="4645800" cy="3485160"/>
           </a:xfrm>
           <a:prstGeom prst="rect">
             <a:avLst/>
@@ -406,7 +406,7 @@
         <p:spPr>
           <a:xfrm>
             <a:off x="689040" y="4416120"/>
-            <a:ext cx="5502960" cy="3096720"/>
+            <a:ext cx="5502600" cy="3096720"/>
           </a:xfrm>
           <a:prstGeom prst="rect">
             <a:avLst/>
@@ -454,7 +454,7 @@
         <p:spPr>
           <a:xfrm>
             <a:off x="3900600" y="8831160"/>
-            <a:ext cx="2979000" cy="462960"/>
+            <a:ext cx="2978640" cy="462600"/>
           </a:xfrm>
           <a:custGeom>
             <a:avLst/>
@@ -503,7 +503,7 @@
                 <a:spcPct val="100000"/>
               </a:lnSpc>
             </a:pPr>
-            <a:fld id="{AB7C6282-0D49-49F7-9461-63CD2BD56EC2}" type="slidenum">
+            <a:fld id="{2817BBAE-1098-4F02-856E-76BE749ECFCA}" type="slidenum">
               <a:rPr b="0" lang="en-US" sz="1200" spc="-1" strike="noStrike">
                 <a:solidFill>
                   <a:srgbClr val="000000"/>
@@ -531,7 +531,7 @@
         <p:spPr>
           <a:xfrm>
             <a:off x="1117440" y="698400"/>
-            <a:ext cx="4646160" cy="3485520"/>
+            <a:ext cx="4645800" cy="3485160"/>
           </a:xfrm>
           <a:prstGeom prst="rect">
             <a:avLst/>
@@ -551,7 +551,7 @@
         <p:spPr>
           <a:xfrm>
             <a:off x="689040" y="4416120"/>
-            <a:ext cx="5502960" cy="3096720"/>
+            <a:ext cx="5502600" cy="3096720"/>
           </a:xfrm>
           <a:prstGeom prst="rect">
             <a:avLst/>
@@ -599,7 +599,7 @@
         <p:spPr>
           <a:xfrm>
             <a:off x="3900600" y="8831160"/>
-            <a:ext cx="2979000" cy="462960"/>
+            <a:ext cx="2978640" cy="462600"/>
           </a:xfrm>
           <a:custGeom>
             <a:avLst/>
@@ -648,7 +648,7 @@
                 <a:spcPct val="100000"/>
               </a:lnSpc>
             </a:pPr>
-            <a:fld id="{00AA2377-2911-410D-94E9-CF075BE6BD28}" type="slidenum">
+            <a:fld id="{96A1D1F5-C05A-46A9-85C4-1CA170308C4C}" type="slidenum">
               <a:rPr b="0" lang="en-US" sz="1200" spc="-1" strike="noStrike">
                 <a:solidFill>
                   <a:srgbClr val="000000"/>
@@ -676,7 +676,7 @@
         <p:spPr>
           <a:xfrm>
             <a:off x="1117440" y="698400"/>
-            <a:ext cx="4646160" cy="3485520"/>
+            <a:ext cx="4645800" cy="3485160"/>
           </a:xfrm>
           <a:prstGeom prst="rect">
             <a:avLst/>
@@ -696,7 +696,7 @@
         <p:spPr>
           <a:xfrm>
             <a:off x="689040" y="4416120"/>
-            <a:ext cx="5502960" cy="3096720"/>
+            <a:ext cx="5502600" cy="3096720"/>
           </a:xfrm>
           <a:prstGeom prst="rect">
             <a:avLst/>
@@ -744,7 +744,7 @@
         <p:spPr>
           <a:xfrm>
             <a:off x="3900600" y="8831160"/>
-            <a:ext cx="2979000" cy="462960"/>
+            <a:ext cx="2978640" cy="462600"/>
           </a:xfrm>
           <a:custGeom>
             <a:avLst/>
@@ -793,7 +793,7 @@
                 <a:spcPct val="100000"/>
               </a:lnSpc>
             </a:pPr>
-            <a:fld id="{2D9C59BC-FDA2-4FEA-9CFD-E344F6E456A8}" type="slidenum">
+            <a:fld id="{917DCDBC-DE4E-4F07-AD05-3E6C5C5DB531}" type="slidenum">
               <a:rPr b="0" lang="en-US" sz="1200" spc="-1" strike="noStrike">
                 <a:solidFill>
                   <a:srgbClr val="000000"/>
@@ -821,7 +821,7 @@
         <p:spPr>
           <a:xfrm>
             <a:off x="1117440" y="698400"/>
-            <a:ext cx="4646160" cy="3485520"/>
+            <a:ext cx="4645800" cy="3485160"/>
           </a:xfrm>
           <a:prstGeom prst="rect">
             <a:avLst/>
@@ -841,7 +841,7 @@
         <p:spPr>
           <a:xfrm>
             <a:off x="689040" y="4416120"/>
-            <a:ext cx="5502960" cy="3096720"/>
+            <a:ext cx="5502600" cy="3096720"/>
           </a:xfrm>
           <a:prstGeom prst="rect">
             <a:avLst/>
@@ -889,7 +889,7 @@
         <p:spPr>
           <a:xfrm>
             <a:off x="3900600" y="8831160"/>
-            <a:ext cx="2979000" cy="462960"/>
+            <a:ext cx="2978640" cy="462600"/>
           </a:xfrm>
           <a:custGeom>
             <a:avLst/>
@@ -938,7 +938,7 @@
                 <a:spcPct val="100000"/>
               </a:lnSpc>
             </a:pPr>
-            <a:fld id="{52379F9A-49B8-4EE6-A919-44E9F614B465}" type="slidenum">
+            <a:fld id="{2EBDB6AC-FE71-47F1-AEC1-790C48F0309B}" type="slidenum">
               <a:rPr b="0" lang="en-US" sz="1200" spc="-1" strike="noStrike">
                 <a:solidFill>
                   <a:srgbClr val="000000"/>
@@ -966,7 +966,7 @@
         <p:spPr>
           <a:xfrm>
             <a:off x="1117440" y="698400"/>
-            <a:ext cx="4646160" cy="3485520"/>
+            <a:ext cx="4645800" cy="3485160"/>
           </a:xfrm>
           <a:prstGeom prst="rect">
             <a:avLst/>
@@ -986,7 +986,7 @@
         <p:spPr>
           <a:xfrm>
             <a:off x="689040" y="4416120"/>
-            <a:ext cx="5502960" cy="3096720"/>
+            <a:ext cx="5502600" cy="3096720"/>
           </a:xfrm>
           <a:prstGeom prst="rect">
             <a:avLst/>
@@ -1034,7 +1034,7 @@
         <p:spPr>
           <a:xfrm>
             <a:off x="3900600" y="8831160"/>
-            <a:ext cx="2979000" cy="462960"/>
+            <a:ext cx="2978640" cy="462600"/>
           </a:xfrm>
           <a:custGeom>
             <a:avLst/>
@@ -1083,7 +1083,7 @@
                 <a:spcPct val="100000"/>
               </a:lnSpc>
             </a:pPr>
-            <a:fld id="{A6AF1848-15D1-4076-AE3B-416EC6361E67}" type="slidenum">
+            <a:fld id="{5785563D-0EE8-4C76-8BDE-B44152E7E9D8}" type="slidenum">
               <a:rPr b="0" lang="en-US" sz="1200" spc="-1" strike="noStrike">
                 <a:solidFill>
                   <a:srgbClr val="000000"/>
@@ -1111,7 +1111,7 @@
         <p:spPr>
           <a:xfrm>
             <a:off x="1117440" y="698400"/>
-            <a:ext cx="4646160" cy="3485520"/>
+            <a:ext cx="4645800" cy="3485160"/>
           </a:xfrm>
           <a:prstGeom prst="rect">
             <a:avLst/>
@@ -1131,7 +1131,7 @@
         <p:spPr>
           <a:xfrm>
             <a:off x="689040" y="4416120"/>
-            <a:ext cx="5502960" cy="3096720"/>
+            <a:ext cx="5502600" cy="3096720"/>
           </a:xfrm>
           <a:prstGeom prst="rect">
             <a:avLst/>
@@ -1183,7 +1183,7 @@
         <p:spPr>
           <a:xfrm>
             <a:off x="1117440" y="698400"/>
-            <a:ext cx="4646160" cy="3485520"/>
+            <a:ext cx="4645800" cy="3485160"/>
           </a:xfrm>
           <a:prstGeom prst="rect">
             <a:avLst/>
@@ -1203,7 +1203,7 @@
         <p:spPr>
           <a:xfrm>
             <a:off x="689040" y="4416120"/>
-            <a:ext cx="5502960" cy="3096720"/>
+            <a:ext cx="5502600" cy="3096720"/>
           </a:xfrm>
           <a:prstGeom prst="rect">
             <a:avLst/>
@@ -1229,7 +1229,7 @@
         <p:spPr>
           <a:xfrm>
             <a:off x="3900600" y="8831160"/>
-            <a:ext cx="2979000" cy="462960"/>
+            <a:ext cx="2978640" cy="462600"/>
           </a:xfrm>
           <a:custGeom>
             <a:avLst/>
@@ -1278,7 +1278,7 @@
                 <a:spcPct val="100000"/>
               </a:lnSpc>
             </a:pPr>
-            <a:fld id="{F333CFE7-5488-47A2-9A04-3EE66AD49855}" type="slidenum">
+            <a:fld id="{73DC9682-F990-4E86-B124-13179ABE59EE}" type="slidenum">
               <a:rPr b="0" lang="en-US" sz="1200" spc="-1" strike="noStrike">
                 <a:solidFill>
                   <a:srgbClr val="000000"/>
@@ -1324,7 +1324,7 @@
         <p:spPr>
           <a:xfrm>
             <a:off x="5265720" y="6535800"/>
-            <a:ext cx="4028040" cy="343440"/>
+            <a:ext cx="4027680" cy="343080"/>
           </a:xfrm>
           <a:prstGeom prst="rect">
             <a:avLst/>
@@ -1350,7 +1350,7 @@
                 <a:spcPct val="100000"/>
               </a:lnSpc>
             </a:pPr>
-            <a:fld id="{4AC676EC-62D3-4CF3-AFF5-954867EAC87E}" type="slidenum">
+            <a:fld id="{6320FAA6-C428-4B71-814D-B475B4C39E8D}" type="slidenum">
               <a:rPr b="0" lang="en-US" sz="1200" spc="-1" strike="noStrike">
                 <a:solidFill>
                   <a:srgbClr val="000000"/>
@@ -1379,7 +1379,7 @@
         <p:spPr>
           <a:xfrm>
             <a:off x="2927520" y="515880"/>
-            <a:ext cx="3440520" cy="2580120"/>
+            <a:ext cx="3440160" cy="2579760"/>
           </a:xfrm>
           <a:prstGeom prst="rect">
             <a:avLst/>
@@ -1399,7 +1399,7 @@
         <p:spPr>
           <a:xfrm>
             <a:off x="930240" y="3268800"/>
-            <a:ext cx="7434720" cy="3096000"/>
+            <a:ext cx="7434360" cy="3095640"/>
           </a:xfrm>
           <a:prstGeom prst="rect">
             <a:avLst/>
@@ -1447,7 +1447,7 @@
         <p:spPr>
           <a:xfrm>
             <a:off x="5265720" y="6535800"/>
-            <a:ext cx="4028040" cy="343440"/>
+            <a:ext cx="4027680" cy="343080"/>
           </a:xfrm>
           <a:prstGeom prst="rect">
             <a:avLst/>
@@ -1473,7 +1473,7 @@
                 <a:spcPct val="100000"/>
               </a:lnSpc>
             </a:pPr>
-            <a:fld id="{3C2D5FF6-6B19-49E8-B480-18F43B3D2503}" type="slidenum">
+            <a:fld id="{F403D966-F342-4A13-BEF9-64A2A9C80168}" type="slidenum">
               <a:rPr b="0" lang="en-US" sz="1200" spc="-1" strike="noStrike">
                 <a:solidFill>
                   <a:srgbClr val="000000"/>
@@ -1502,7 +1502,7 @@
         <p:spPr>
           <a:xfrm>
             <a:off x="2927520" y="515880"/>
-            <a:ext cx="3440520" cy="2580120"/>
+            <a:ext cx="3440160" cy="2579760"/>
           </a:xfrm>
           <a:prstGeom prst="rect">
             <a:avLst/>
@@ -1522,7 +1522,7 @@
         <p:spPr>
           <a:xfrm>
             <a:off x="930240" y="3268800"/>
-            <a:ext cx="7434720" cy="3096000"/>
+            <a:ext cx="7434360" cy="3095640"/>
           </a:xfrm>
           <a:prstGeom prst="rect">
             <a:avLst/>
@@ -1574,7 +1574,7 @@
         <p:spPr>
           <a:xfrm>
             <a:off x="2927520" y="515880"/>
-            <a:ext cx="3440520" cy="2580120"/>
+            <a:ext cx="3440160" cy="2579760"/>
           </a:xfrm>
           <a:prstGeom prst="rect">
             <a:avLst/>
@@ -1594,7 +1594,7 @@
         <p:spPr>
           <a:xfrm>
             <a:off x="930240" y="3268800"/>
-            <a:ext cx="7434720" cy="3096000"/>
+            <a:ext cx="7434360" cy="3095640"/>
           </a:xfrm>
           <a:prstGeom prst="rect">
             <a:avLst/>
@@ -1620,7 +1620,7 @@
         <p:spPr>
           <a:xfrm>
             <a:off x="5265720" y="6535800"/>
-            <a:ext cx="4028040" cy="343440"/>
+            <a:ext cx="4027680" cy="343080"/>
           </a:xfrm>
           <a:prstGeom prst="rect">
             <a:avLst/>
@@ -1646,7 +1646,7 @@
                 <a:spcPct val="100000"/>
               </a:lnSpc>
             </a:pPr>
-            <a:fld id="{2384E118-0073-4A71-A7B0-D5A003661498}" type="slidenum">
+            <a:fld id="{F71B9FB6-A1C4-4146-9504-B1F48FAB09C8}" type="slidenum">
               <a:rPr b="0" lang="en-US" sz="1200" spc="-1" strike="noStrike">
                 <a:solidFill>
                   <a:srgbClr val="000000"/>
@@ -1693,7 +1693,7 @@
         <p:spPr>
           <a:xfrm>
             <a:off x="5265720" y="6535800"/>
-            <a:ext cx="4028040" cy="343440"/>
+            <a:ext cx="4027680" cy="343080"/>
           </a:xfrm>
           <a:prstGeom prst="rect">
             <a:avLst/>
@@ -1719,7 +1719,7 @@
                 <a:spcPct val="100000"/>
               </a:lnSpc>
             </a:pPr>
-            <a:fld id="{807BEEFA-D9AF-4C7A-AC58-4CC7903BB71D}" type="slidenum">
+            <a:fld id="{E0CF1B96-F4B5-4E1C-8C72-33BCA133753A}" type="slidenum">
               <a:rPr b="0" lang="en-US" sz="1200" spc="-1" strike="noStrike">
                 <a:solidFill>
                   <a:srgbClr val="000000"/>
@@ -1747,7 +1747,7 @@
         <p:spPr>
           <a:xfrm>
             <a:off x="2927520" y="515880"/>
-            <a:ext cx="3440520" cy="2580120"/>
+            <a:ext cx="3440160" cy="2579760"/>
           </a:xfrm>
           <a:prstGeom prst="rect">
             <a:avLst/>
@@ -1767,7 +1767,7 @@
         <p:spPr>
           <a:xfrm>
             <a:off x="930240" y="3268800"/>
-            <a:ext cx="7434720" cy="3096000"/>
+            <a:ext cx="7434360" cy="3095640"/>
           </a:xfrm>
           <a:prstGeom prst="rect">
             <a:avLst/>
@@ -1815,7 +1815,7 @@
         <p:spPr>
           <a:xfrm>
             <a:off x="5265720" y="6535800"/>
-            <a:ext cx="4028040" cy="343440"/>
+            <a:ext cx="4027680" cy="343080"/>
           </a:xfrm>
           <a:prstGeom prst="rect">
             <a:avLst/>
@@ -1841,7 +1841,7 @@
                 <a:spcPct val="100000"/>
               </a:lnSpc>
             </a:pPr>
-            <a:fld id="{1F1F4DAB-4007-455E-BB45-C9C2C0ACADAA}" type="slidenum">
+            <a:fld id="{B02B572E-86ED-4A78-AF58-67FBB2B96138}" type="slidenum">
               <a:rPr b="0" lang="en-US" sz="1200" spc="-1" strike="noStrike">
                 <a:solidFill>
                   <a:srgbClr val="000000"/>
@@ -1869,7 +1869,7 @@
         <p:spPr>
           <a:xfrm>
             <a:off x="2927520" y="515880"/>
-            <a:ext cx="3440520" cy="2580120"/>
+            <a:ext cx="3440160" cy="2579760"/>
           </a:xfrm>
           <a:prstGeom prst="rect">
             <a:avLst/>
@@ -1889,7 +1889,7 @@
         <p:spPr>
           <a:xfrm>
             <a:off x="930240" y="3268800"/>
-            <a:ext cx="7434720" cy="3096000"/>
+            <a:ext cx="7434360" cy="3095640"/>
           </a:xfrm>
           <a:prstGeom prst="rect">
             <a:avLst/>
@@ -1962,8 +1962,8 @@
         </p:nvSpPr>
         <p:spPr>
           <a:xfrm>
-            <a:off x="457200" y="273240"/>
-            <a:ext cx="8228880" cy="1145160"/>
+            <a:off x="457200" y="273600"/>
+            <a:ext cx="8229240" cy="1144800"/>
           </a:xfrm>
           <a:prstGeom prst="rect">
             <a:avLst/>
@@ -1994,7 +1994,7 @@
         <p:spPr>
           <a:xfrm>
             <a:off x="457200" y="1604520"/>
-            <a:ext cx="8228880" cy="1896840"/>
+            <a:ext cx="8229240" cy="1896840"/>
           </a:xfrm>
           <a:prstGeom prst="rect">
             <a:avLst/>
@@ -2024,7 +2024,7 @@
         <p:spPr>
           <a:xfrm>
             <a:off x="457200" y="3682080"/>
-            <a:ext cx="8228880" cy="1896840"/>
+            <a:ext cx="8229240" cy="1896840"/>
           </a:xfrm>
           <a:prstGeom prst="rect">
             <a:avLst/>
@@ -2075,8 +2075,8 @@
         </p:nvSpPr>
         <p:spPr>
           <a:xfrm>
-            <a:off x="457200" y="273240"/>
-            <a:ext cx="8228880" cy="1145160"/>
+            <a:off x="457200" y="273600"/>
+            <a:ext cx="8229240" cy="1144800"/>
           </a:xfrm>
           <a:prstGeom prst="rect">
             <a:avLst/>
@@ -2107,7 +2107,7 @@
         <p:spPr>
           <a:xfrm>
             <a:off x="457200" y="1604520"/>
-            <a:ext cx="4015440" cy="1896840"/>
+            <a:ext cx="4015800" cy="1896840"/>
           </a:xfrm>
           <a:prstGeom prst="rect">
             <a:avLst/>
@@ -2136,8 +2136,8 @@
         </p:nvSpPr>
         <p:spPr>
           <a:xfrm>
-            <a:off x="4673880" y="1604520"/>
-            <a:ext cx="4015440" cy="1896840"/>
+            <a:off x="4674240" y="1604520"/>
+            <a:ext cx="4015800" cy="1896840"/>
           </a:xfrm>
           <a:prstGeom prst="rect">
             <a:avLst/>
@@ -2167,7 +2167,7 @@
         <p:spPr>
           <a:xfrm>
             <a:off x="457200" y="3682080"/>
-            <a:ext cx="4015440" cy="1896840"/>
+            <a:ext cx="4015800" cy="1896840"/>
           </a:xfrm>
           <a:prstGeom prst="rect">
             <a:avLst/>
@@ -2196,8 +2196,8 @@
         </p:nvSpPr>
         <p:spPr>
           <a:xfrm>
-            <a:off x="4673880" y="3682080"/>
-            <a:ext cx="4015440" cy="1896840"/>
+            <a:off x="4674240" y="3682080"/>
+            <a:ext cx="4015800" cy="1896840"/>
           </a:xfrm>
           <a:prstGeom prst="rect">
             <a:avLst/>
@@ -2248,8 +2248,8 @@
         </p:nvSpPr>
         <p:spPr>
           <a:xfrm>
-            <a:off x="457200" y="273240"/>
-            <a:ext cx="8228880" cy="1145160"/>
+            <a:off x="457200" y="273600"/>
+            <a:ext cx="8229240" cy="1144800"/>
           </a:xfrm>
           <a:prstGeom prst="rect">
             <a:avLst/>
@@ -2503,8 +2503,8 @@
         </p:nvSpPr>
         <p:spPr>
           <a:xfrm>
-            <a:off x="457200" y="273240"/>
-            <a:ext cx="8228880" cy="1145160"/>
+            <a:off x="457200" y="273600"/>
+            <a:ext cx="8229240" cy="1144800"/>
           </a:xfrm>
           <a:prstGeom prst="rect">
             <a:avLst/>
@@ -2535,7 +2535,7 @@
         <p:spPr>
           <a:xfrm>
             <a:off x="457200" y="1604520"/>
-            <a:ext cx="8228880" cy="3976920"/>
+            <a:ext cx="8229240" cy="3977280"/>
           </a:xfrm>
           <a:prstGeom prst="rect">
             <a:avLst/>
@@ -2587,8 +2587,8 @@
         </p:nvSpPr>
         <p:spPr>
           <a:xfrm>
-            <a:off x="457200" y="273240"/>
-            <a:ext cx="8228880" cy="1145160"/>
+            <a:off x="457200" y="273600"/>
+            <a:ext cx="8229240" cy="1144800"/>
           </a:xfrm>
           <a:prstGeom prst="rect">
             <a:avLst/>
@@ -2619,7 +2619,7 @@
         <p:spPr>
           <a:xfrm>
             <a:off x="457200" y="1604520"/>
-            <a:ext cx="8228880" cy="3976920"/>
+            <a:ext cx="8229240" cy="3977280"/>
           </a:xfrm>
           <a:prstGeom prst="rect">
             <a:avLst/>
@@ -2670,8 +2670,8 @@
         </p:nvSpPr>
         <p:spPr>
           <a:xfrm>
-            <a:off x="457200" y="273240"/>
-            <a:ext cx="8228880" cy="1145160"/>
+            <a:off x="457200" y="273600"/>
+            <a:ext cx="8229240" cy="1144800"/>
           </a:xfrm>
           <a:prstGeom prst="rect">
             <a:avLst/>
@@ -2702,7 +2702,7 @@
         <p:spPr>
           <a:xfrm>
             <a:off x="457200" y="1604520"/>
-            <a:ext cx="4015440" cy="3976920"/>
+            <a:ext cx="4015800" cy="3977280"/>
           </a:xfrm>
           <a:prstGeom prst="rect">
             <a:avLst/>
@@ -2731,8 +2731,8 @@
         </p:nvSpPr>
         <p:spPr>
           <a:xfrm>
-            <a:off x="4673880" y="1604520"/>
-            <a:ext cx="4015440" cy="3976920"/>
+            <a:off x="4674240" y="1604520"/>
+            <a:ext cx="4015800" cy="3977280"/>
           </a:xfrm>
           <a:prstGeom prst="rect">
             <a:avLst/>
@@ -2783,8 +2783,8 @@
         </p:nvSpPr>
         <p:spPr>
           <a:xfrm>
-            <a:off x="457200" y="273240"/>
-            <a:ext cx="8228880" cy="1145160"/>
+            <a:off x="457200" y="273600"/>
+            <a:ext cx="8229240" cy="1144800"/>
           </a:xfrm>
           <a:prstGeom prst="rect">
             <a:avLst/>
@@ -2836,8 +2836,8 @@
         </p:nvSpPr>
         <p:spPr>
           <a:xfrm>
-            <a:off x="457200" y="273240"/>
-            <a:ext cx="8228880" cy="5309640"/>
+            <a:off x="457200" y="273600"/>
+            <a:ext cx="8229240" cy="5307840"/>
           </a:xfrm>
           <a:prstGeom prst="rect">
             <a:avLst/>
@@ -2889,8 +2889,8 @@
         </p:nvSpPr>
         <p:spPr>
           <a:xfrm>
-            <a:off x="457200" y="273240"/>
-            <a:ext cx="8228880" cy="1145160"/>
+            <a:off x="457200" y="273600"/>
+            <a:ext cx="8229240" cy="1144800"/>
           </a:xfrm>
           <a:prstGeom prst="rect">
             <a:avLst/>
@@ -2921,7 +2921,7 @@
         <p:spPr>
           <a:xfrm>
             <a:off x="457200" y="1604520"/>
-            <a:ext cx="4015440" cy="1896840"/>
+            <a:ext cx="4015800" cy="1896840"/>
           </a:xfrm>
           <a:prstGeom prst="rect">
             <a:avLst/>
@@ -2950,8 +2950,8 @@
         </p:nvSpPr>
         <p:spPr>
           <a:xfrm>
-            <a:off x="4673880" y="1604520"/>
-            <a:ext cx="4015440" cy="3976920"/>
+            <a:off x="4674240" y="1604520"/>
+            <a:ext cx="4015800" cy="3977280"/>
           </a:xfrm>
           <a:prstGeom prst="rect">
             <a:avLst/>
@@ -2981,7 +2981,7 @@
         <p:spPr>
           <a:xfrm>
             <a:off x="457200" y="3682080"/>
-            <a:ext cx="4015440" cy="1896840"/>
+            <a:ext cx="4015800" cy="1896840"/>
           </a:xfrm>
           <a:prstGeom prst="rect">
             <a:avLst/>
@@ -3032,8 +3032,8 @@
         </p:nvSpPr>
         <p:spPr>
           <a:xfrm>
-            <a:off x="457200" y="273240"/>
-            <a:ext cx="8228880" cy="1145160"/>
+            <a:off x="457200" y="273600"/>
+            <a:ext cx="8229240" cy="1144800"/>
           </a:xfrm>
           <a:prstGeom prst="rect">
             <a:avLst/>
@@ -3064,7 +3064,7 @@
         <p:spPr>
           <a:xfrm>
             <a:off x="457200" y="1604520"/>
-            <a:ext cx="8228880" cy="3976920"/>
+            <a:ext cx="8229240" cy="3977280"/>
           </a:xfrm>
           <a:prstGeom prst="rect">
             <a:avLst/>
@@ -3116,8 +3116,8 @@
         </p:nvSpPr>
         <p:spPr>
           <a:xfrm>
-            <a:off x="457200" y="273240"/>
-            <a:ext cx="8228880" cy="1145160"/>
+            <a:off x="457200" y="273600"/>
+            <a:ext cx="8229240" cy="1144800"/>
           </a:xfrm>
           <a:prstGeom prst="rect">
             <a:avLst/>
@@ -3148,7 +3148,7 @@
         <p:spPr>
           <a:xfrm>
             <a:off x="457200" y="1604520"/>
-            <a:ext cx="4015440" cy="3976920"/>
+            <a:ext cx="4015800" cy="3977280"/>
           </a:xfrm>
           <a:prstGeom prst="rect">
             <a:avLst/>
@@ -3177,8 +3177,8 @@
         </p:nvSpPr>
         <p:spPr>
           <a:xfrm>
-            <a:off x="4673880" y="1604520"/>
-            <a:ext cx="4015440" cy="1896840"/>
+            <a:off x="4674240" y="1604520"/>
+            <a:ext cx="4015800" cy="1896840"/>
           </a:xfrm>
           <a:prstGeom prst="rect">
             <a:avLst/>
@@ -3207,8 +3207,8 @@
         </p:nvSpPr>
         <p:spPr>
           <a:xfrm>
-            <a:off x="4673880" y="3682080"/>
-            <a:ext cx="4015440" cy="1896840"/>
+            <a:off x="4674240" y="3682080"/>
+            <a:ext cx="4015800" cy="1896840"/>
           </a:xfrm>
           <a:prstGeom prst="rect">
             <a:avLst/>
@@ -3259,8 +3259,8 @@
         </p:nvSpPr>
         <p:spPr>
           <a:xfrm>
-            <a:off x="457200" y="273240"/>
-            <a:ext cx="8228880" cy="1145160"/>
+            <a:off x="457200" y="273600"/>
+            <a:ext cx="8229240" cy="1144800"/>
           </a:xfrm>
           <a:prstGeom prst="rect">
             <a:avLst/>
@@ -3291,7 +3291,7 @@
         <p:spPr>
           <a:xfrm>
             <a:off x="457200" y="1604520"/>
-            <a:ext cx="4015440" cy="1896840"/>
+            <a:ext cx="4015800" cy="1896840"/>
           </a:xfrm>
           <a:prstGeom prst="rect">
             <a:avLst/>
@@ -3320,8 +3320,8 @@
         </p:nvSpPr>
         <p:spPr>
           <a:xfrm>
-            <a:off x="4673880" y="1604520"/>
-            <a:ext cx="4015440" cy="1896840"/>
+            <a:off x="4674240" y="1604520"/>
+            <a:ext cx="4015800" cy="1896840"/>
           </a:xfrm>
           <a:prstGeom prst="rect">
             <a:avLst/>
@@ -3351,7 +3351,7 @@
         <p:spPr>
           <a:xfrm>
             <a:off x="457200" y="3682080"/>
-            <a:ext cx="8228880" cy="1896840"/>
+            <a:ext cx="8229240" cy="1896840"/>
           </a:xfrm>
           <a:prstGeom prst="rect">
             <a:avLst/>
@@ -3402,8 +3402,8 @@
         </p:nvSpPr>
         <p:spPr>
           <a:xfrm>
-            <a:off x="457200" y="273240"/>
-            <a:ext cx="8228880" cy="1145160"/>
+            <a:off x="457200" y="273600"/>
+            <a:ext cx="8229240" cy="1144800"/>
           </a:xfrm>
           <a:prstGeom prst="rect">
             <a:avLst/>
@@ -3434,7 +3434,7 @@
         <p:spPr>
           <a:xfrm>
             <a:off x="457200" y="1604520"/>
-            <a:ext cx="8228880" cy="1896840"/>
+            <a:ext cx="8229240" cy="1896840"/>
           </a:xfrm>
           <a:prstGeom prst="rect">
             <a:avLst/>
@@ -3464,7 +3464,7 @@
         <p:spPr>
           <a:xfrm>
             <a:off x="457200" y="3682080"/>
-            <a:ext cx="8228880" cy="1896840"/>
+            <a:ext cx="8229240" cy="1896840"/>
           </a:xfrm>
           <a:prstGeom prst="rect">
             <a:avLst/>
@@ -3515,8 +3515,8 @@
         </p:nvSpPr>
         <p:spPr>
           <a:xfrm>
-            <a:off x="457200" y="273240"/>
-            <a:ext cx="8228880" cy="1145160"/>
+            <a:off x="457200" y="273600"/>
+            <a:ext cx="8229240" cy="1144800"/>
           </a:xfrm>
           <a:prstGeom prst="rect">
             <a:avLst/>
@@ -3547,7 +3547,7 @@
         <p:spPr>
           <a:xfrm>
             <a:off x="457200" y="1604520"/>
-            <a:ext cx="4015440" cy="1896840"/>
+            <a:ext cx="4015800" cy="1896840"/>
           </a:xfrm>
           <a:prstGeom prst="rect">
             <a:avLst/>
@@ -3576,8 +3576,8 @@
         </p:nvSpPr>
         <p:spPr>
           <a:xfrm>
-            <a:off x="4673880" y="1604520"/>
-            <a:ext cx="4015440" cy="1896840"/>
+            <a:off x="4674240" y="1604520"/>
+            <a:ext cx="4015800" cy="1896840"/>
           </a:xfrm>
           <a:prstGeom prst="rect">
             <a:avLst/>
@@ -3607,7 +3607,7 @@
         <p:spPr>
           <a:xfrm>
             <a:off x="457200" y="3682080"/>
-            <a:ext cx="4015440" cy="1896840"/>
+            <a:ext cx="4015800" cy="1896840"/>
           </a:xfrm>
           <a:prstGeom prst="rect">
             <a:avLst/>
@@ -3636,8 +3636,8 @@
         </p:nvSpPr>
         <p:spPr>
           <a:xfrm>
-            <a:off x="4673880" y="3682080"/>
-            <a:ext cx="4015440" cy="1896840"/>
+            <a:off x="4674240" y="3682080"/>
+            <a:ext cx="4015800" cy="1896840"/>
           </a:xfrm>
           <a:prstGeom prst="rect">
             <a:avLst/>
@@ -3688,8 +3688,8 @@
         </p:nvSpPr>
         <p:spPr>
           <a:xfrm>
-            <a:off x="457200" y="273240"/>
-            <a:ext cx="8228880" cy="1145160"/>
+            <a:off x="457200" y="273600"/>
+            <a:ext cx="8229240" cy="1144800"/>
           </a:xfrm>
           <a:prstGeom prst="rect">
             <a:avLst/>
@@ -3943,8 +3943,8 @@
         </p:nvSpPr>
         <p:spPr>
           <a:xfrm>
-            <a:off x="457200" y="273240"/>
-            <a:ext cx="8228880" cy="1145160"/>
+            <a:off x="457200" y="273600"/>
+            <a:ext cx="8229240" cy="1144800"/>
           </a:xfrm>
           <a:prstGeom prst="rect">
             <a:avLst/>
@@ -3975,7 +3975,7 @@
         <p:spPr>
           <a:xfrm>
             <a:off x="457200" y="1604520"/>
-            <a:ext cx="8228880" cy="3976920"/>
+            <a:ext cx="8229240" cy="3977280"/>
           </a:xfrm>
           <a:prstGeom prst="rect">
             <a:avLst/>
@@ -4027,8 +4027,8 @@
         </p:nvSpPr>
         <p:spPr>
           <a:xfrm>
-            <a:off x="457200" y="273240"/>
-            <a:ext cx="8228880" cy="1145160"/>
+            <a:off x="457200" y="273600"/>
+            <a:ext cx="8229240" cy="1144800"/>
           </a:xfrm>
           <a:prstGeom prst="rect">
             <a:avLst/>
@@ -4059,7 +4059,7 @@
         <p:spPr>
           <a:xfrm>
             <a:off x="457200" y="1604520"/>
-            <a:ext cx="8228880" cy="3976920"/>
+            <a:ext cx="8229240" cy="3977280"/>
           </a:xfrm>
           <a:prstGeom prst="rect">
             <a:avLst/>
@@ -4110,8 +4110,8 @@
         </p:nvSpPr>
         <p:spPr>
           <a:xfrm>
-            <a:off x="457200" y="273240"/>
-            <a:ext cx="8228880" cy="1145160"/>
+            <a:off x="457200" y="273600"/>
+            <a:ext cx="8229240" cy="1144800"/>
           </a:xfrm>
           <a:prstGeom prst="rect">
             <a:avLst/>
@@ -4142,7 +4142,7 @@
         <p:spPr>
           <a:xfrm>
             <a:off x="457200" y="1604520"/>
-            <a:ext cx="4015440" cy="3976920"/>
+            <a:ext cx="4015800" cy="3977280"/>
           </a:xfrm>
           <a:prstGeom prst="rect">
             <a:avLst/>
@@ -4171,8 +4171,8 @@
         </p:nvSpPr>
         <p:spPr>
           <a:xfrm>
-            <a:off x="4673880" y="1604520"/>
-            <a:ext cx="4015440" cy="3976920"/>
+            <a:off x="4674240" y="1604520"/>
+            <a:ext cx="4015800" cy="3977280"/>
           </a:xfrm>
           <a:prstGeom prst="rect">
             <a:avLst/>
@@ -4223,8 +4223,8 @@
         </p:nvSpPr>
         <p:spPr>
           <a:xfrm>
-            <a:off x="457200" y="273240"/>
-            <a:ext cx="8228880" cy="1145160"/>
+            <a:off x="457200" y="273600"/>
+            <a:ext cx="8229240" cy="1144800"/>
           </a:xfrm>
           <a:prstGeom prst="rect">
             <a:avLst/>
@@ -4276,8 +4276,8 @@
         </p:nvSpPr>
         <p:spPr>
           <a:xfrm>
-            <a:off x="457200" y="273240"/>
-            <a:ext cx="8228880" cy="1145160"/>
+            <a:off x="457200" y="273600"/>
+            <a:ext cx="8229240" cy="1144800"/>
           </a:xfrm>
           <a:prstGeom prst="rect">
             <a:avLst/>
@@ -4308,7 +4308,7 @@
         <p:spPr>
           <a:xfrm>
             <a:off x="457200" y="1604520"/>
-            <a:ext cx="8228880" cy="3976920"/>
+            <a:ext cx="8229240" cy="3977280"/>
           </a:xfrm>
           <a:prstGeom prst="rect">
             <a:avLst/>
@@ -4359,8 +4359,8 @@
         </p:nvSpPr>
         <p:spPr>
           <a:xfrm>
-            <a:off x="457200" y="273240"/>
-            <a:ext cx="8228880" cy="5309640"/>
+            <a:off x="457200" y="273600"/>
+            <a:ext cx="8229240" cy="5307840"/>
           </a:xfrm>
           <a:prstGeom prst="rect">
             <a:avLst/>
@@ -4412,8 +4412,8 @@
         </p:nvSpPr>
         <p:spPr>
           <a:xfrm>
-            <a:off x="457200" y="273240"/>
-            <a:ext cx="8228880" cy="1145160"/>
+            <a:off x="457200" y="273600"/>
+            <a:ext cx="8229240" cy="1144800"/>
           </a:xfrm>
           <a:prstGeom prst="rect">
             <a:avLst/>
@@ -4444,7 +4444,7 @@
         <p:spPr>
           <a:xfrm>
             <a:off x="457200" y="1604520"/>
-            <a:ext cx="4015440" cy="1896840"/>
+            <a:ext cx="4015800" cy="1896840"/>
           </a:xfrm>
           <a:prstGeom prst="rect">
             <a:avLst/>
@@ -4473,8 +4473,8 @@
         </p:nvSpPr>
         <p:spPr>
           <a:xfrm>
-            <a:off x="4673880" y="1604520"/>
-            <a:ext cx="4015440" cy="3976920"/>
+            <a:off x="4674240" y="1604520"/>
+            <a:ext cx="4015800" cy="3977280"/>
           </a:xfrm>
           <a:prstGeom prst="rect">
             <a:avLst/>
@@ -4504,7 +4504,7 @@
         <p:spPr>
           <a:xfrm>
             <a:off x="457200" y="3682080"/>
-            <a:ext cx="4015440" cy="1896840"/>
+            <a:ext cx="4015800" cy="1896840"/>
           </a:xfrm>
           <a:prstGeom prst="rect">
             <a:avLst/>
@@ -4555,8 +4555,8 @@
         </p:nvSpPr>
         <p:spPr>
           <a:xfrm>
-            <a:off x="457200" y="273240"/>
-            <a:ext cx="8228880" cy="1145160"/>
+            <a:off x="457200" y="273600"/>
+            <a:ext cx="8229240" cy="1144800"/>
           </a:xfrm>
           <a:prstGeom prst="rect">
             <a:avLst/>
@@ -4587,7 +4587,7 @@
         <p:spPr>
           <a:xfrm>
             <a:off x="457200" y="1604520"/>
-            <a:ext cx="4015440" cy="3976920"/>
+            <a:ext cx="4015800" cy="3977280"/>
           </a:xfrm>
           <a:prstGeom prst="rect">
             <a:avLst/>
@@ -4616,8 +4616,8 @@
         </p:nvSpPr>
         <p:spPr>
           <a:xfrm>
-            <a:off x="4673880" y="1604520"/>
-            <a:ext cx="4015440" cy="1896840"/>
+            <a:off x="4674240" y="1604520"/>
+            <a:ext cx="4015800" cy="1896840"/>
           </a:xfrm>
           <a:prstGeom prst="rect">
             <a:avLst/>
@@ -4646,8 +4646,8 @@
         </p:nvSpPr>
         <p:spPr>
           <a:xfrm>
-            <a:off x="4673880" y="3682080"/>
-            <a:ext cx="4015440" cy="1896840"/>
+            <a:off x="4674240" y="3682080"/>
+            <a:ext cx="4015800" cy="1896840"/>
           </a:xfrm>
           <a:prstGeom prst="rect">
             <a:avLst/>
@@ -4698,8 +4698,8 @@
         </p:nvSpPr>
         <p:spPr>
           <a:xfrm>
-            <a:off x="457200" y="273240"/>
-            <a:ext cx="8228880" cy="1145160"/>
+            <a:off x="457200" y="273600"/>
+            <a:ext cx="8229240" cy="1144800"/>
           </a:xfrm>
           <a:prstGeom prst="rect">
             <a:avLst/>
@@ -4730,7 +4730,7 @@
         <p:spPr>
           <a:xfrm>
             <a:off x="457200" y="1604520"/>
-            <a:ext cx="4015440" cy="1896840"/>
+            <a:ext cx="4015800" cy="1896840"/>
           </a:xfrm>
           <a:prstGeom prst="rect">
             <a:avLst/>
@@ -4759,8 +4759,8 @@
         </p:nvSpPr>
         <p:spPr>
           <a:xfrm>
-            <a:off x="4673880" y="1604520"/>
-            <a:ext cx="4015440" cy="1896840"/>
+            <a:off x="4674240" y="1604520"/>
+            <a:ext cx="4015800" cy="1896840"/>
           </a:xfrm>
           <a:prstGeom prst="rect">
             <a:avLst/>
@@ -4790,7 +4790,7 @@
         <p:spPr>
           <a:xfrm>
             <a:off x="457200" y="3682080"/>
-            <a:ext cx="8228880" cy="1896840"/>
+            <a:ext cx="8229240" cy="1896840"/>
           </a:xfrm>
           <a:prstGeom prst="rect">
             <a:avLst/>
@@ -4841,8 +4841,8 @@
         </p:nvSpPr>
         <p:spPr>
           <a:xfrm>
-            <a:off x="457200" y="273240"/>
-            <a:ext cx="8228880" cy="1145160"/>
+            <a:off x="457200" y="273600"/>
+            <a:ext cx="8229240" cy="1144800"/>
           </a:xfrm>
           <a:prstGeom prst="rect">
             <a:avLst/>
@@ -4873,7 +4873,7 @@
         <p:spPr>
           <a:xfrm>
             <a:off x="457200" y="1604520"/>
-            <a:ext cx="8228880" cy="1896840"/>
+            <a:ext cx="8229240" cy="1896840"/>
           </a:xfrm>
           <a:prstGeom prst="rect">
             <a:avLst/>
@@ -4903,7 +4903,7 @@
         <p:spPr>
           <a:xfrm>
             <a:off x="457200" y="3682080"/>
-            <a:ext cx="8228880" cy="1896840"/>
+            <a:ext cx="8229240" cy="1896840"/>
           </a:xfrm>
           <a:prstGeom prst="rect">
             <a:avLst/>
@@ -4954,8 +4954,8 @@
         </p:nvSpPr>
         <p:spPr>
           <a:xfrm>
-            <a:off x="457200" y="273240"/>
-            <a:ext cx="8228880" cy="1145160"/>
+            <a:off x="457200" y="273600"/>
+            <a:ext cx="8229240" cy="1144800"/>
           </a:xfrm>
           <a:prstGeom prst="rect">
             <a:avLst/>
@@ -4986,7 +4986,7 @@
         <p:spPr>
           <a:xfrm>
             <a:off x="457200" y="1604520"/>
-            <a:ext cx="4015440" cy="1896840"/>
+            <a:ext cx="4015800" cy="1896840"/>
           </a:xfrm>
           <a:prstGeom prst="rect">
             <a:avLst/>
@@ -5015,8 +5015,8 @@
         </p:nvSpPr>
         <p:spPr>
           <a:xfrm>
-            <a:off x="4673880" y="1604520"/>
-            <a:ext cx="4015440" cy="1896840"/>
+            <a:off x="4674240" y="1604520"/>
+            <a:ext cx="4015800" cy="1896840"/>
           </a:xfrm>
           <a:prstGeom prst="rect">
             <a:avLst/>
@@ -5046,7 +5046,7 @@
         <p:spPr>
           <a:xfrm>
             <a:off x="457200" y="3682080"/>
-            <a:ext cx="4015440" cy="1896840"/>
+            <a:ext cx="4015800" cy="1896840"/>
           </a:xfrm>
           <a:prstGeom prst="rect">
             <a:avLst/>
@@ -5075,8 +5075,8 @@
         </p:nvSpPr>
         <p:spPr>
           <a:xfrm>
-            <a:off x="4673880" y="3682080"/>
-            <a:ext cx="4015440" cy="1896840"/>
+            <a:off x="4674240" y="3682080"/>
+            <a:ext cx="4015800" cy="1896840"/>
           </a:xfrm>
           <a:prstGeom prst="rect">
             <a:avLst/>
@@ -5127,8 +5127,8 @@
         </p:nvSpPr>
         <p:spPr>
           <a:xfrm>
-            <a:off x="457200" y="273240"/>
-            <a:ext cx="8228880" cy="1145160"/>
+            <a:off x="457200" y="273600"/>
+            <a:ext cx="8229240" cy="1144800"/>
           </a:xfrm>
           <a:prstGeom prst="rect">
             <a:avLst/>
@@ -5382,8 +5382,8 @@
         </p:nvSpPr>
         <p:spPr>
           <a:xfrm>
-            <a:off x="457200" y="273240"/>
-            <a:ext cx="8228880" cy="1145160"/>
+            <a:off x="457200" y="273600"/>
+            <a:ext cx="8229240" cy="1144800"/>
           </a:xfrm>
           <a:prstGeom prst="rect">
             <a:avLst/>
@@ -5414,7 +5414,7 @@
         <p:spPr>
           <a:xfrm>
             <a:off x="457200" y="1604520"/>
-            <a:ext cx="8228880" cy="3976920"/>
+            <a:ext cx="8229240" cy="3977280"/>
           </a:xfrm>
           <a:prstGeom prst="rect">
             <a:avLst/>
@@ -5466,8 +5466,8 @@
         </p:nvSpPr>
         <p:spPr>
           <a:xfrm>
-            <a:off x="457200" y="273240"/>
-            <a:ext cx="8228880" cy="1145160"/>
+            <a:off x="457200" y="273600"/>
+            <a:ext cx="8229240" cy="1144800"/>
           </a:xfrm>
           <a:prstGeom prst="rect">
             <a:avLst/>
@@ -5498,7 +5498,7 @@
         <p:spPr>
           <a:xfrm>
             <a:off x="457200" y="1604520"/>
-            <a:ext cx="8228880" cy="3976920"/>
+            <a:ext cx="8229240" cy="3977280"/>
           </a:xfrm>
           <a:prstGeom prst="rect">
             <a:avLst/>
@@ -5549,8 +5549,8 @@
         </p:nvSpPr>
         <p:spPr>
           <a:xfrm>
-            <a:off x="457200" y="273240"/>
-            <a:ext cx="8228880" cy="1145160"/>
+            <a:off x="457200" y="273600"/>
+            <a:ext cx="8229240" cy="1144800"/>
           </a:xfrm>
           <a:prstGeom prst="rect">
             <a:avLst/>
@@ -5581,7 +5581,7 @@
         <p:spPr>
           <a:xfrm>
             <a:off x="457200" y="1604520"/>
-            <a:ext cx="4015440" cy="3976920"/>
+            <a:ext cx="4015800" cy="3977280"/>
           </a:xfrm>
           <a:prstGeom prst="rect">
             <a:avLst/>
@@ -5610,8 +5610,8 @@
         </p:nvSpPr>
         <p:spPr>
           <a:xfrm>
-            <a:off x="4673880" y="1604520"/>
-            <a:ext cx="4015440" cy="3976920"/>
+            <a:off x="4674240" y="1604520"/>
+            <a:ext cx="4015800" cy="3977280"/>
           </a:xfrm>
           <a:prstGeom prst="rect">
             <a:avLst/>
@@ -5662,8 +5662,8 @@
         </p:nvSpPr>
         <p:spPr>
           <a:xfrm>
-            <a:off x="457200" y="273240"/>
-            <a:ext cx="8228880" cy="1145160"/>
+            <a:off x="457200" y="273600"/>
+            <a:ext cx="8229240" cy="1144800"/>
           </a:xfrm>
           <a:prstGeom prst="rect">
             <a:avLst/>
@@ -5694,7 +5694,7 @@
         <p:spPr>
           <a:xfrm>
             <a:off x="457200" y="1604520"/>
-            <a:ext cx="4015440" cy="3976920"/>
+            <a:ext cx="4015800" cy="3977280"/>
           </a:xfrm>
           <a:prstGeom prst="rect">
             <a:avLst/>
@@ -5723,8 +5723,8 @@
         </p:nvSpPr>
         <p:spPr>
           <a:xfrm>
-            <a:off x="4673880" y="1604520"/>
-            <a:ext cx="4015440" cy="3976920"/>
+            <a:off x="4674240" y="1604520"/>
+            <a:ext cx="4015800" cy="3977280"/>
           </a:xfrm>
           <a:prstGeom prst="rect">
             <a:avLst/>
@@ -5775,8 +5775,8 @@
         </p:nvSpPr>
         <p:spPr>
           <a:xfrm>
-            <a:off x="457200" y="273240"/>
-            <a:ext cx="8228880" cy="1145160"/>
+            <a:off x="457200" y="273600"/>
+            <a:ext cx="8229240" cy="1144800"/>
           </a:xfrm>
           <a:prstGeom prst="rect">
             <a:avLst/>
@@ -5828,8 +5828,8 @@
         </p:nvSpPr>
         <p:spPr>
           <a:xfrm>
-            <a:off x="457200" y="273240"/>
-            <a:ext cx="8228880" cy="5309640"/>
+            <a:off x="457200" y="273600"/>
+            <a:ext cx="8229240" cy="5307840"/>
           </a:xfrm>
           <a:prstGeom prst="rect">
             <a:avLst/>
@@ -5881,8 +5881,8 @@
         </p:nvSpPr>
         <p:spPr>
           <a:xfrm>
-            <a:off x="457200" y="273240"/>
-            <a:ext cx="8228880" cy="1145160"/>
+            <a:off x="457200" y="273600"/>
+            <a:ext cx="8229240" cy="1144800"/>
           </a:xfrm>
           <a:prstGeom prst="rect">
             <a:avLst/>
@@ -5913,7 +5913,7 @@
         <p:spPr>
           <a:xfrm>
             <a:off x="457200" y="1604520"/>
-            <a:ext cx="4015440" cy="1896840"/>
+            <a:ext cx="4015800" cy="1896840"/>
           </a:xfrm>
           <a:prstGeom prst="rect">
             <a:avLst/>
@@ -5942,8 +5942,8 @@
         </p:nvSpPr>
         <p:spPr>
           <a:xfrm>
-            <a:off x="4673880" y="1604520"/>
-            <a:ext cx="4015440" cy="3976920"/>
+            <a:off x="4674240" y="1604520"/>
+            <a:ext cx="4015800" cy="3977280"/>
           </a:xfrm>
           <a:prstGeom prst="rect">
             <a:avLst/>
@@ -5973,7 +5973,7 @@
         <p:spPr>
           <a:xfrm>
             <a:off x="457200" y="3682080"/>
-            <a:ext cx="4015440" cy="1896840"/>
+            <a:ext cx="4015800" cy="1896840"/>
           </a:xfrm>
           <a:prstGeom prst="rect">
             <a:avLst/>
@@ -6024,8 +6024,8 @@
         </p:nvSpPr>
         <p:spPr>
           <a:xfrm>
-            <a:off x="457200" y="273240"/>
-            <a:ext cx="8228880" cy="1145160"/>
+            <a:off x="457200" y="273600"/>
+            <a:ext cx="8229240" cy="1144800"/>
           </a:xfrm>
           <a:prstGeom prst="rect">
             <a:avLst/>
@@ -6056,7 +6056,7 @@
         <p:spPr>
           <a:xfrm>
             <a:off x="457200" y="1604520"/>
-            <a:ext cx="4015440" cy="3976920"/>
+            <a:ext cx="4015800" cy="3977280"/>
           </a:xfrm>
           <a:prstGeom prst="rect">
             <a:avLst/>
@@ -6085,8 +6085,8 @@
         </p:nvSpPr>
         <p:spPr>
           <a:xfrm>
-            <a:off x="4673880" y="1604520"/>
-            <a:ext cx="4015440" cy="1896840"/>
+            <a:off x="4674240" y="1604520"/>
+            <a:ext cx="4015800" cy="1896840"/>
           </a:xfrm>
           <a:prstGeom prst="rect">
             <a:avLst/>
@@ -6115,8 +6115,8 @@
         </p:nvSpPr>
         <p:spPr>
           <a:xfrm>
-            <a:off x="4673880" y="3682080"/>
-            <a:ext cx="4015440" cy="1896840"/>
+            <a:off x="4674240" y="3682080"/>
+            <a:ext cx="4015800" cy="1896840"/>
           </a:xfrm>
           <a:prstGeom prst="rect">
             <a:avLst/>
@@ -6167,8 +6167,8 @@
         </p:nvSpPr>
         <p:spPr>
           <a:xfrm>
-            <a:off x="457200" y="273240"/>
-            <a:ext cx="8228880" cy="1145160"/>
+            <a:off x="457200" y="273600"/>
+            <a:ext cx="8229240" cy="1144800"/>
           </a:xfrm>
           <a:prstGeom prst="rect">
             <a:avLst/>
@@ -6199,7 +6199,7 @@
         <p:spPr>
           <a:xfrm>
             <a:off x="457200" y="1604520"/>
-            <a:ext cx="4015440" cy="1896840"/>
+            <a:ext cx="4015800" cy="1896840"/>
           </a:xfrm>
           <a:prstGeom prst="rect">
             <a:avLst/>
@@ -6228,8 +6228,8 @@
         </p:nvSpPr>
         <p:spPr>
           <a:xfrm>
-            <a:off x="4673880" y="1604520"/>
-            <a:ext cx="4015440" cy="1896840"/>
+            <a:off x="4674240" y="1604520"/>
+            <a:ext cx="4015800" cy="1896840"/>
           </a:xfrm>
           <a:prstGeom prst="rect">
             <a:avLst/>
@@ -6259,7 +6259,7 @@
         <p:spPr>
           <a:xfrm>
             <a:off x="457200" y="3682080"/>
-            <a:ext cx="8228880" cy="1896840"/>
+            <a:ext cx="8229240" cy="1896840"/>
           </a:xfrm>
           <a:prstGeom prst="rect">
             <a:avLst/>
@@ -6310,8 +6310,8 @@
         </p:nvSpPr>
         <p:spPr>
           <a:xfrm>
-            <a:off x="457200" y="273240"/>
-            <a:ext cx="8228880" cy="1145160"/>
+            <a:off x="457200" y="273600"/>
+            <a:ext cx="8229240" cy="1144800"/>
           </a:xfrm>
           <a:prstGeom prst="rect">
             <a:avLst/>
@@ -6342,7 +6342,7 @@
         <p:spPr>
           <a:xfrm>
             <a:off x="457200" y="1604520"/>
-            <a:ext cx="8228880" cy="1896840"/>
+            <a:ext cx="8229240" cy="1896840"/>
           </a:xfrm>
           <a:prstGeom prst="rect">
             <a:avLst/>
@@ -6372,7 +6372,7 @@
         <p:spPr>
           <a:xfrm>
             <a:off x="457200" y="3682080"/>
-            <a:ext cx="8228880" cy="1896840"/>
+            <a:ext cx="8229240" cy="1896840"/>
           </a:xfrm>
           <a:prstGeom prst="rect">
             <a:avLst/>
@@ -6423,8 +6423,8 @@
         </p:nvSpPr>
         <p:spPr>
           <a:xfrm>
-            <a:off x="457200" y="273240"/>
-            <a:ext cx="8228880" cy="1145160"/>
+            <a:off x="457200" y="273600"/>
+            <a:ext cx="8229240" cy="1144800"/>
           </a:xfrm>
           <a:prstGeom prst="rect">
             <a:avLst/>
@@ -6455,7 +6455,7 @@
         <p:spPr>
           <a:xfrm>
             <a:off x="457200" y="1604520"/>
-            <a:ext cx="4015440" cy="1896840"/>
+            <a:ext cx="4015800" cy="1896840"/>
           </a:xfrm>
           <a:prstGeom prst="rect">
             <a:avLst/>
@@ -6484,8 +6484,8 @@
         </p:nvSpPr>
         <p:spPr>
           <a:xfrm>
-            <a:off x="4673880" y="1604520"/>
-            <a:ext cx="4015440" cy="1896840"/>
+            <a:off x="4674240" y="1604520"/>
+            <a:ext cx="4015800" cy="1896840"/>
           </a:xfrm>
           <a:prstGeom prst="rect">
             <a:avLst/>
@@ -6515,7 +6515,7 @@
         <p:spPr>
           <a:xfrm>
             <a:off x="457200" y="3682080"/>
-            <a:ext cx="4015440" cy="1896840"/>
+            <a:ext cx="4015800" cy="1896840"/>
           </a:xfrm>
           <a:prstGeom prst="rect">
             <a:avLst/>
@@ -6544,8 +6544,8 @@
         </p:nvSpPr>
         <p:spPr>
           <a:xfrm>
-            <a:off x="4673880" y="3682080"/>
-            <a:ext cx="4015440" cy="1896840"/>
+            <a:off x="4674240" y="3682080"/>
+            <a:ext cx="4015800" cy="1896840"/>
           </a:xfrm>
           <a:prstGeom prst="rect">
             <a:avLst/>
@@ -6596,8 +6596,8 @@
         </p:nvSpPr>
         <p:spPr>
           <a:xfrm>
-            <a:off x="457200" y="273240"/>
-            <a:ext cx="8228880" cy="1145160"/>
+            <a:off x="457200" y="273600"/>
+            <a:ext cx="8229240" cy="1144800"/>
           </a:xfrm>
           <a:prstGeom prst="rect">
             <a:avLst/>
@@ -6851,8 +6851,8 @@
         </p:nvSpPr>
         <p:spPr>
           <a:xfrm>
-            <a:off x="457200" y="273240"/>
-            <a:ext cx="8228880" cy="1145160"/>
+            <a:off x="457200" y="273600"/>
+            <a:ext cx="8229240" cy="1144800"/>
           </a:xfrm>
           <a:prstGeom prst="rect">
             <a:avLst/>
@@ -6904,8 +6904,8 @@
         </p:nvSpPr>
         <p:spPr>
           <a:xfrm>
-            <a:off x="457200" y="273240"/>
-            <a:ext cx="8228880" cy="1145160"/>
+            <a:off x="457200" y="273600"/>
+            <a:ext cx="8229240" cy="1144800"/>
           </a:xfrm>
           <a:prstGeom prst="rect">
             <a:avLst/>
@@ -6936,7 +6936,7 @@
         <p:spPr>
           <a:xfrm>
             <a:off x="457200" y="1604520"/>
-            <a:ext cx="8228880" cy="3976920"/>
+            <a:ext cx="8229240" cy="3977280"/>
           </a:xfrm>
           <a:prstGeom prst="rect">
             <a:avLst/>
@@ -6988,8 +6988,8 @@
         </p:nvSpPr>
         <p:spPr>
           <a:xfrm>
-            <a:off x="457200" y="273240"/>
-            <a:ext cx="8228880" cy="1145160"/>
+            <a:off x="457200" y="273600"/>
+            <a:ext cx="8229240" cy="1144800"/>
           </a:xfrm>
           <a:prstGeom prst="rect">
             <a:avLst/>
@@ -7020,7 +7020,7 @@
         <p:spPr>
           <a:xfrm>
             <a:off x="457200" y="1604520"/>
-            <a:ext cx="8228880" cy="3976920"/>
+            <a:ext cx="8229240" cy="3977280"/>
           </a:xfrm>
           <a:prstGeom prst="rect">
             <a:avLst/>
@@ -7071,8 +7071,8 @@
         </p:nvSpPr>
         <p:spPr>
           <a:xfrm>
-            <a:off x="457200" y="273240"/>
-            <a:ext cx="8228880" cy="1145160"/>
+            <a:off x="457200" y="273600"/>
+            <a:ext cx="8229240" cy="1144800"/>
           </a:xfrm>
           <a:prstGeom prst="rect">
             <a:avLst/>
@@ -7103,7 +7103,7 @@
         <p:spPr>
           <a:xfrm>
             <a:off x="457200" y="1604520"/>
-            <a:ext cx="4015440" cy="3976920"/>
+            <a:ext cx="4015800" cy="3977280"/>
           </a:xfrm>
           <a:prstGeom prst="rect">
             <a:avLst/>
@@ -7132,8 +7132,8 @@
         </p:nvSpPr>
         <p:spPr>
           <a:xfrm>
-            <a:off x="4673880" y="1604520"/>
-            <a:ext cx="4015440" cy="3976920"/>
+            <a:off x="4674240" y="1604520"/>
+            <a:ext cx="4015800" cy="3977280"/>
           </a:xfrm>
           <a:prstGeom prst="rect">
             <a:avLst/>
@@ -7184,8 +7184,8 @@
         </p:nvSpPr>
         <p:spPr>
           <a:xfrm>
-            <a:off x="457200" y="273240"/>
-            <a:ext cx="8228880" cy="1145160"/>
+            <a:off x="457200" y="273600"/>
+            <a:ext cx="8229240" cy="1144800"/>
           </a:xfrm>
           <a:prstGeom prst="rect">
             <a:avLst/>
@@ -7237,8 +7237,8 @@
         </p:nvSpPr>
         <p:spPr>
           <a:xfrm>
-            <a:off x="457200" y="273240"/>
-            <a:ext cx="8228880" cy="5309640"/>
+            <a:off x="457200" y="273600"/>
+            <a:ext cx="8229240" cy="5307840"/>
           </a:xfrm>
           <a:prstGeom prst="rect">
             <a:avLst/>
@@ -7290,8 +7290,8 @@
         </p:nvSpPr>
         <p:spPr>
           <a:xfrm>
-            <a:off x="457200" y="273240"/>
-            <a:ext cx="8228880" cy="1145160"/>
+            <a:off x="457200" y="273600"/>
+            <a:ext cx="8229240" cy="1144800"/>
           </a:xfrm>
           <a:prstGeom prst="rect">
             <a:avLst/>
@@ -7322,7 +7322,7 @@
         <p:spPr>
           <a:xfrm>
             <a:off x="457200" y="1604520"/>
-            <a:ext cx="4015440" cy="1896840"/>
+            <a:ext cx="4015800" cy="1896840"/>
           </a:xfrm>
           <a:prstGeom prst="rect">
             <a:avLst/>
@@ -7351,8 +7351,8 @@
         </p:nvSpPr>
         <p:spPr>
           <a:xfrm>
-            <a:off x="4673880" y="1604520"/>
-            <a:ext cx="4015440" cy="3976920"/>
+            <a:off x="4674240" y="1604520"/>
+            <a:ext cx="4015800" cy="3977280"/>
           </a:xfrm>
           <a:prstGeom prst="rect">
             <a:avLst/>
@@ -7382,7 +7382,7 @@
         <p:spPr>
           <a:xfrm>
             <a:off x="457200" y="3682080"/>
-            <a:ext cx="4015440" cy="1896840"/>
+            <a:ext cx="4015800" cy="1896840"/>
           </a:xfrm>
           <a:prstGeom prst="rect">
             <a:avLst/>
@@ -7433,8 +7433,8 @@
         </p:nvSpPr>
         <p:spPr>
           <a:xfrm>
-            <a:off x="457200" y="273240"/>
-            <a:ext cx="8228880" cy="1145160"/>
+            <a:off x="457200" y="273600"/>
+            <a:ext cx="8229240" cy="1144800"/>
           </a:xfrm>
           <a:prstGeom prst="rect">
             <a:avLst/>
@@ -7465,7 +7465,7 @@
         <p:spPr>
           <a:xfrm>
             <a:off x="457200" y="1604520"/>
-            <a:ext cx="4015440" cy="3976920"/>
+            <a:ext cx="4015800" cy="3977280"/>
           </a:xfrm>
           <a:prstGeom prst="rect">
             <a:avLst/>
@@ -7494,8 +7494,8 @@
         </p:nvSpPr>
         <p:spPr>
           <a:xfrm>
-            <a:off x="4673880" y="1604520"/>
-            <a:ext cx="4015440" cy="1896840"/>
+            <a:off x="4674240" y="1604520"/>
+            <a:ext cx="4015800" cy="1896840"/>
           </a:xfrm>
           <a:prstGeom prst="rect">
             <a:avLst/>
@@ -7524,8 +7524,8 @@
         </p:nvSpPr>
         <p:spPr>
           <a:xfrm>
-            <a:off x="4673880" y="3682080"/>
-            <a:ext cx="4015440" cy="1896840"/>
+            <a:off x="4674240" y="3682080"/>
+            <a:ext cx="4015800" cy="1896840"/>
           </a:xfrm>
           <a:prstGeom prst="rect">
             <a:avLst/>
@@ -7576,8 +7576,8 @@
         </p:nvSpPr>
         <p:spPr>
           <a:xfrm>
-            <a:off x="457200" y="273240"/>
-            <a:ext cx="8228880" cy="1145160"/>
+            <a:off x="457200" y="273600"/>
+            <a:ext cx="8229240" cy="1144800"/>
           </a:xfrm>
           <a:prstGeom prst="rect">
             <a:avLst/>
@@ -7608,7 +7608,7 @@
         <p:spPr>
           <a:xfrm>
             <a:off x="457200" y="1604520"/>
-            <a:ext cx="4015440" cy="1896840"/>
+            <a:ext cx="4015800" cy="1896840"/>
           </a:xfrm>
           <a:prstGeom prst="rect">
             <a:avLst/>
@@ -7637,8 +7637,8 @@
         </p:nvSpPr>
         <p:spPr>
           <a:xfrm>
-            <a:off x="4673880" y="1604520"/>
-            <a:ext cx="4015440" cy="1896840"/>
+            <a:off x="4674240" y="1604520"/>
+            <a:ext cx="4015800" cy="1896840"/>
           </a:xfrm>
           <a:prstGeom prst="rect">
             <a:avLst/>
@@ -7668,7 +7668,7 @@
         <p:spPr>
           <a:xfrm>
             <a:off x="457200" y="3682080"/>
-            <a:ext cx="8228880" cy="1896840"/>
+            <a:ext cx="8229240" cy="1896840"/>
           </a:xfrm>
           <a:prstGeom prst="rect">
             <a:avLst/>
@@ -7719,8 +7719,8 @@
         </p:nvSpPr>
         <p:spPr>
           <a:xfrm>
-            <a:off x="457200" y="273240"/>
-            <a:ext cx="8228880" cy="1145160"/>
+            <a:off x="457200" y="273600"/>
+            <a:ext cx="8229240" cy="1144800"/>
           </a:xfrm>
           <a:prstGeom prst="rect">
             <a:avLst/>
@@ -7751,7 +7751,7 @@
         <p:spPr>
           <a:xfrm>
             <a:off x="457200" y="1604520"/>
-            <a:ext cx="8228880" cy="1896840"/>
+            <a:ext cx="8229240" cy="1896840"/>
           </a:xfrm>
           <a:prstGeom prst="rect">
             <a:avLst/>
@@ -7781,7 +7781,7 @@
         <p:spPr>
           <a:xfrm>
             <a:off x="457200" y="3682080"/>
-            <a:ext cx="8228880" cy="1896840"/>
+            <a:ext cx="8229240" cy="1896840"/>
           </a:xfrm>
           <a:prstGeom prst="rect">
             <a:avLst/>
@@ -7832,8 +7832,8 @@
         </p:nvSpPr>
         <p:spPr>
           <a:xfrm>
-            <a:off x="457200" y="273240"/>
-            <a:ext cx="8228880" cy="1145160"/>
+            <a:off x="457200" y="273600"/>
+            <a:ext cx="8229240" cy="1144800"/>
           </a:xfrm>
           <a:prstGeom prst="rect">
             <a:avLst/>
@@ -7864,7 +7864,7 @@
         <p:spPr>
           <a:xfrm>
             <a:off x="457200" y="1604520"/>
-            <a:ext cx="4015440" cy="1896840"/>
+            <a:ext cx="4015800" cy="1896840"/>
           </a:xfrm>
           <a:prstGeom prst="rect">
             <a:avLst/>
@@ -7893,8 +7893,8 @@
         </p:nvSpPr>
         <p:spPr>
           <a:xfrm>
-            <a:off x="4673880" y="1604520"/>
-            <a:ext cx="4015440" cy="1896840"/>
+            <a:off x="4674240" y="1604520"/>
+            <a:ext cx="4015800" cy="1896840"/>
           </a:xfrm>
           <a:prstGeom prst="rect">
             <a:avLst/>
@@ -7924,7 +7924,7 @@
         <p:spPr>
           <a:xfrm>
             <a:off x="457200" y="3682080"/>
-            <a:ext cx="4015440" cy="1896840"/>
+            <a:ext cx="4015800" cy="1896840"/>
           </a:xfrm>
           <a:prstGeom prst="rect">
             <a:avLst/>
@@ -7953,8 +7953,8 @@
         </p:nvSpPr>
         <p:spPr>
           <a:xfrm>
-            <a:off x="4673880" y="3682080"/>
-            <a:ext cx="4015440" cy="1896840"/>
+            <a:off x="4674240" y="3682080"/>
+            <a:ext cx="4015800" cy="1896840"/>
           </a:xfrm>
           <a:prstGeom prst="rect">
             <a:avLst/>
@@ -8005,8 +8005,8 @@
         </p:nvSpPr>
         <p:spPr>
           <a:xfrm>
-            <a:off x="457200" y="273240"/>
-            <a:ext cx="8228880" cy="5309640"/>
+            <a:off x="457200" y="273600"/>
+            <a:ext cx="8229240" cy="5307840"/>
           </a:xfrm>
           <a:prstGeom prst="rect">
             <a:avLst/>
@@ -8058,8 +8058,8 @@
         </p:nvSpPr>
         <p:spPr>
           <a:xfrm>
-            <a:off x="457200" y="273240"/>
-            <a:ext cx="8228880" cy="1145160"/>
+            <a:off x="457200" y="273600"/>
+            <a:ext cx="8229240" cy="1144800"/>
           </a:xfrm>
           <a:prstGeom prst="rect">
             <a:avLst/>
@@ -8313,8 +8313,8 @@
         </p:nvSpPr>
         <p:spPr>
           <a:xfrm>
-            <a:off x="457200" y="273240"/>
-            <a:ext cx="8228880" cy="1145160"/>
+            <a:off x="457200" y="273600"/>
+            <a:ext cx="8229240" cy="1144800"/>
           </a:xfrm>
           <a:prstGeom prst="rect">
             <a:avLst/>
@@ -8345,7 +8345,7 @@
         <p:spPr>
           <a:xfrm>
             <a:off x="457200" y="1604520"/>
-            <a:ext cx="8228880" cy="3976920"/>
+            <a:ext cx="8229240" cy="3977280"/>
           </a:xfrm>
           <a:prstGeom prst="rect">
             <a:avLst/>
@@ -8397,8 +8397,8 @@
         </p:nvSpPr>
         <p:spPr>
           <a:xfrm>
-            <a:off x="457200" y="273240"/>
-            <a:ext cx="8228880" cy="1145160"/>
+            <a:off x="457200" y="273600"/>
+            <a:ext cx="8229240" cy="1144800"/>
           </a:xfrm>
           <a:prstGeom prst="rect">
             <a:avLst/>
@@ -8429,7 +8429,7 @@
         <p:spPr>
           <a:xfrm>
             <a:off x="457200" y="1604520"/>
-            <a:ext cx="8228880" cy="3976920"/>
+            <a:ext cx="8229240" cy="3977280"/>
           </a:xfrm>
           <a:prstGeom prst="rect">
             <a:avLst/>
@@ -8480,8 +8480,8 @@
         </p:nvSpPr>
         <p:spPr>
           <a:xfrm>
-            <a:off x="457200" y="273240"/>
-            <a:ext cx="8228880" cy="1145160"/>
+            <a:off x="457200" y="273600"/>
+            <a:ext cx="8229240" cy="1144800"/>
           </a:xfrm>
           <a:prstGeom prst="rect">
             <a:avLst/>
@@ -8512,7 +8512,7 @@
         <p:spPr>
           <a:xfrm>
             <a:off x="457200" y="1604520"/>
-            <a:ext cx="4015440" cy="3976920"/>
+            <a:ext cx="4015800" cy="3977280"/>
           </a:xfrm>
           <a:prstGeom prst="rect">
             <a:avLst/>
@@ -8541,8 +8541,8 @@
         </p:nvSpPr>
         <p:spPr>
           <a:xfrm>
-            <a:off x="4673880" y="1604520"/>
-            <a:ext cx="4015440" cy="3976920"/>
+            <a:off x="4674240" y="1604520"/>
+            <a:ext cx="4015800" cy="3977280"/>
           </a:xfrm>
           <a:prstGeom prst="rect">
             <a:avLst/>
@@ -8593,8 +8593,8 @@
         </p:nvSpPr>
         <p:spPr>
           <a:xfrm>
-            <a:off x="457200" y="273240"/>
-            <a:ext cx="8228880" cy="1145160"/>
+            <a:off x="457200" y="273600"/>
+            <a:ext cx="8229240" cy="1144800"/>
           </a:xfrm>
           <a:prstGeom prst="rect">
             <a:avLst/>
@@ -8646,8 +8646,8 @@
         </p:nvSpPr>
         <p:spPr>
           <a:xfrm>
-            <a:off x="457200" y="273240"/>
-            <a:ext cx="8228880" cy="5309640"/>
+            <a:off x="457200" y="273600"/>
+            <a:ext cx="8229240" cy="5307840"/>
           </a:xfrm>
           <a:prstGeom prst="rect">
             <a:avLst/>
@@ -8699,8 +8699,8 @@
         </p:nvSpPr>
         <p:spPr>
           <a:xfrm>
-            <a:off x="457200" y="273240"/>
-            <a:ext cx="8228880" cy="1145160"/>
+            <a:off x="457200" y="273600"/>
+            <a:ext cx="8229240" cy="1144800"/>
           </a:xfrm>
           <a:prstGeom prst="rect">
             <a:avLst/>
@@ -8731,7 +8731,7 @@
         <p:spPr>
           <a:xfrm>
             <a:off x="457200" y="1604520"/>
-            <a:ext cx="4015440" cy="1896840"/>
+            <a:ext cx="4015800" cy="1896840"/>
           </a:xfrm>
           <a:prstGeom prst="rect">
             <a:avLst/>
@@ -8760,8 +8760,8 @@
         </p:nvSpPr>
         <p:spPr>
           <a:xfrm>
-            <a:off x="4673880" y="1604520"/>
-            <a:ext cx="4015440" cy="3976920"/>
+            <a:off x="4674240" y="1604520"/>
+            <a:ext cx="4015800" cy="3977280"/>
           </a:xfrm>
           <a:prstGeom prst="rect">
             <a:avLst/>
@@ -8791,7 +8791,7 @@
         <p:spPr>
           <a:xfrm>
             <a:off x="457200" y="3682080"/>
-            <a:ext cx="4015440" cy="1896840"/>
+            <a:ext cx="4015800" cy="1896840"/>
           </a:xfrm>
           <a:prstGeom prst="rect">
             <a:avLst/>
@@ -8842,8 +8842,8 @@
         </p:nvSpPr>
         <p:spPr>
           <a:xfrm>
-            <a:off x="457200" y="273240"/>
-            <a:ext cx="8228880" cy="1145160"/>
+            <a:off x="457200" y="273600"/>
+            <a:ext cx="8229240" cy="1144800"/>
           </a:xfrm>
           <a:prstGeom prst="rect">
             <a:avLst/>
@@ -8874,7 +8874,7 @@
         <p:spPr>
           <a:xfrm>
             <a:off x="457200" y="1604520"/>
-            <a:ext cx="4015440" cy="3976920"/>
+            <a:ext cx="4015800" cy="3977280"/>
           </a:xfrm>
           <a:prstGeom prst="rect">
             <a:avLst/>
@@ -8903,8 +8903,8 @@
         </p:nvSpPr>
         <p:spPr>
           <a:xfrm>
-            <a:off x="4673880" y="1604520"/>
-            <a:ext cx="4015440" cy="1896840"/>
+            <a:off x="4674240" y="1604520"/>
+            <a:ext cx="4015800" cy="1896840"/>
           </a:xfrm>
           <a:prstGeom prst="rect">
             <a:avLst/>
@@ -8933,8 +8933,8 @@
         </p:nvSpPr>
         <p:spPr>
           <a:xfrm>
-            <a:off x="4673880" y="3682080"/>
-            <a:ext cx="4015440" cy="1896840"/>
+            <a:off x="4674240" y="3682080"/>
+            <a:ext cx="4015800" cy="1896840"/>
           </a:xfrm>
           <a:prstGeom prst="rect">
             <a:avLst/>
@@ -8985,8 +8985,8 @@
         </p:nvSpPr>
         <p:spPr>
           <a:xfrm>
-            <a:off x="457200" y="273240"/>
-            <a:ext cx="8228880" cy="1145160"/>
+            <a:off x="457200" y="273600"/>
+            <a:ext cx="8229240" cy="1144800"/>
           </a:xfrm>
           <a:prstGeom prst="rect">
             <a:avLst/>
@@ -9017,7 +9017,7 @@
         <p:spPr>
           <a:xfrm>
             <a:off x="457200" y="1604520"/>
-            <a:ext cx="4015440" cy="1896840"/>
+            <a:ext cx="4015800" cy="1896840"/>
           </a:xfrm>
           <a:prstGeom prst="rect">
             <a:avLst/>
@@ -9046,8 +9046,8 @@
         </p:nvSpPr>
         <p:spPr>
           <a:xfrm>
-            <a:off x="4673880" y="1604520"/>
-            <a:ext cx="4015440" cy="1896840"/>
+            <a:off x="4674240" y="1604520"/>
+            <a:ext cx="4015800" cy="1896840"/>
           </a:xfrm>
           <a:prstGeom prst="rect">
             <a:avLst/>
@@ -9077,7 +9077,7 @@
         <p:spPr>
           <a:xfrm>
             <a:off x="457200" y="3682080"/>
-            <a:ext cx="8228880" cy="1896840"/>
+            <a:ext cx="8229240" cy="1896840"/>
           </a:xfrm>
           <a:prstGeom prst="rect">
             <a:avLst/>
@@ -9128,8 +9128,8 @@
         </p:nvSpPr>
         <p:spPr>
           <a:xfrm>
-            <a:off x="457200" y="273240"/>
-            <a:ext cx="8228880" cy="1145160"/>
+            <a:off x="457200" y="273600"/>
+            <a:ext cx="8229240" cy="1144800"/>
           </a:xfrm>
           <a:prstGeom prst="rect">
             <a:avLst/>
@@ -9160,7 +9160,7 @@
         <p:spPr>
           <a:xfrm>
             <a:off x="457200" y="1604520"/>
-            <a:ext cx="4015440" cy="1896840"/>
+            <a:ext cx="4015800" cy="1896840"/>
           </a:xfrm>
           <a:prstGeom prst="rect">
             <a:avLst/>
@@ -9189,8 +9189,8 @@
         </p:nvSpPr>
         <p:spPr>
           <a:xfrm>
-            <a:off x="4673880" y="1604520"/>
-            <a:ext cx="4015440" cy="3976920"/>
+            <a:off x="4674240" y="1604520"/>
+            <a:ext cx="4015800" cy="3977280"/>
           </a:xfrm>
           <a:prstGeom prst="rect">
             <a:avLst/>
@@ -9220,7 +9220,7 @@
         <p:spPr>
           <a:xfrm>
             <a:off x="457200" y="3682080"/>
-            <a:ext cx="4015440" cy="1896840"/>
+            <a:ext cx="4015800" cy="1896840"/>
           </a:xfrm>
           <a:prstGeom prst="rect">
             <a:avLst/>
@@ -9271,8 +9271,8 @@
         </p:nvSpPr>
         <p:spPr>
           <a:xfrm>
-            <a:off x="457200" y="273240"/>
-            <a:ext cx="8228880" cy="1145160"/>
+            <a:off x="457200" y="273600"/>
+            <a:ext cx="8229240" cy="1144800"/>
           </a:xfrm>
           <a:prstGeom prst="rect">
             <a:avLst/>
@@ -9303,7 +9303,7 @@
         <p:spPr>
           <a:xfrm>
             <a:off x="457200" y="1604520"/>
-            <a:ext cx="8228880" cy="1896840"/>
+            <a:ext cx="8229240" cy="1896840"/>
           </a:xfrm>
           <a:prstGeom prst="rect">
             <a:avLst/>
@@ -9333,7 +9333,7 @@
         <p:spPr>
           <a:xfrm>
             <a:off x="457200" y="3682080"/>
-            <a:ext cx="8228880" cy="1896840"/>
+            <a:ext cx="8229240" cy="1896840"/>
           </a:xfrm>
           <a:prstGeom prst="rect">
             <a:avLst/>
@@ -9384,8 +9384,8 @@
         </p:nvSpPr>
         <p:spPr>
           <a:xfrm>
-            <a:off x="457200" y="273240"/>
-            <a:ext cx="8228880" cy="1145160"/>
+            <a:off x="457200" y="273600"/>
+            <a:ext cx="8229240" cy="1144800"/>
           </a:xfrm>
           <a:prstGeom prst="rect">
             <a:avLst/>
@@ -9416,7 +9416,7 @@
         <p:spPr>
           <a:xfrm>
             <a:off x="457200" y="1604520"/>
-            <a:ext cx="4015440" cy="1896840"/>
+            <a:ext cx="4015800" cy="1896840"/>
           </a:xfrm>
           <a:prstGeom prst="rect">
             <a:avLst/>
@@ -9445,8 +9445,8 @@
         </p:nvSpPr>
         <p:spPr>
           <a:xfrm>
-            <a:off x="4673880" y="1604520"/>
-            <a:ext cx="4015440" cy="1896840"/>
+            <a:off x="4674240" y="1604520"/>
+            <a:ext cx="4015800" cy="1896840"/>
           </a:xfrm>
           <a:prstGeom prst="rect">
             <a:avLst/>
@@ -9476,7 +9476,7 @@
         <p:spPr>
           <a:xfrm>
             <a:off x="457200" y="3682080"/>
-            <a:ext cx="4015440" cy="1896840"/>
+            <a:ext cx="4015800" cy="1896840"/>
           </a:xfrm>
           <a:prstGeom prst="rect">
             <a:avLst/>
@@ -9505,8 +9505,8 @@
         </p:nvSpPr>
         <p:spPr>
           <a:xfrm>
-            <a:off x="4673880" y="3682080"/>
-            <a:ext cx="4015440" cy="1896840"/>
+            <a:off x="4674240" y="3682080"/>
+            <a:ext cx="4015800" cy="1896840"/>
           </a:xfrm>
           <a:prstGeom prst="rect">
             <a:avLst/>
@@ -9557,8 +9557,8 @@
         </p:nvSpPr>
         <p:spPr>
           <a:xfrm>
-            <a:off x="457200" y="273240"/>
-            <a:ext cx="8228880" cy="1145160"/>
+            <a:off x="457200" y="273600"/>
+            <a:ext cx="8229240" cy="1144800"/>
           </a:xfrm>
           <a:prstGeom prst="rect">
             <a:avLst/>
@@ -9790,8 +9790,8 @@
         </p:nvSpPr>
         <p:spPr>
           <a:xfrm>
-            <a:off x="457200" y="273240"/>
-            <a:ext cx="8228880" cy="1145160"/>
+            <a:off x="457200" y="273600"/>
+            <a:ext cx="8229240" cy="1144800"/>
           </a:xfrm>
           <a:prstGeom prst="rect">
             <a:avLst/>
@@ -9822,7 +9822,7 @@
         <p:spPr>
           <a:xfrm>
             <a:off x="457200" y="1604520"/>
-            <a:ext cx="4015440" cy="3976920"/>
+            <a:ext cx="4015800" cy="3977280"/>
           </a:xfrm>
           <a:prstGeom prst="rect">
             <a:avLst/>
@@ -9851,8 +9851,8 @@
         </p:nvSpPr>
         <p:spPr>
           <a:xfrm>
-            <a:off x="4673880" y="1604520"/>
-            <a:ext cx="4015440" cy="1896840"/>
+            <a:off x="4674240" y="1604520"/>
+            <a:ext cx="4015800" cy="1896840"/>
           </a:xfrm>
           <a:prstGeom prst="rect">
             <a:avLst/>
@@ -9881,8 +9881,8 @@
         </p:nvSpPr>
         <p:spPr>
           <a:xfrm>
-            <a:off x="4673880" y="3682080"/>
-            <a:ext cx="4015440" cy="1896840"/>
+            <a:off x="4674240" y="3682080"/>
+            <a:ext cx="4015800" cy="1896840"/>
           </a:xfrm>
           <a:prstGeom prst="rect">
             <a:avLst/>
@@ -9933,8 +9933,8 @@
         </p:nvSpPr>
         <p:spPr>
           <a:xfrm>
-            <a:off x="457200" y="273240"/>
-            <a:ext cx="8228880" cy="1145160"/>
+            <a:off x="457200" y="273600"/>
+            <a:ext cx="8229240" cy="1144800"/>
           </a:xfrm>
           <a:prstGeom prst="rect">
             <a:avLst/>
@@ -9965,7 +9965,7 @@
         <p:spPr>
           <a:xfrm>
             <a:off x="457200" y="1604520"/>
-            <a:ext cx="4015440" cy="1896840"/>
+            <a:ext cx="4015800" cy="1896840"/>
           </a:xfrm>
           <a:prstGeom prst="rect">
             <a:avLst/>
@@ -9994,8 +9994,8 @@
         </p:nvSpPr>
         <p:spPr>
           <a:xfrm>
-            <a:off x="4673880" y="1604520"/>
-            <a:ext cx="4015440" cy="1896840"/>
+            <a:off x="4674240" y="1604520"/>
+            <a:ext cx="4015800" cy="1896840"/>
           </a:xfrm>
           <a:prstGeom prst="rect">
             <a:avLst/>
@@ -10025,7 +10025,7 @@
         <p:spPr>
           <a:xfrm>
             <a:off x="457200" y="3682080"/>
-            <a:ext cx="8228880" cy="1896840"/>
+            <a:ext cx="8229240" cy="1896840"/>
           </a:xfrm>
           <a:prstGeom prst="rect">
             <a:avLst/>
@@ -10080,7 +10080,7 @@
         <p:spPr>
           <a:xfrm>
             <a:off x="0" y="6400800"/>
-            <a:ext cx="9142920" cy="456120"/>
+            <a:ext cx="9142560" cy="455760"/>
           </a:xfrm>
           <a:prstGeom prst="rect">
             <a:avLst/>
@@ -10116,7 +10116,7 @@
         <p:spPr>
           <a:xfrm>
             <a:off x="0" y="6334200"/>
-            <a:ext cx="9142920" cy="64800"/>
+            <a:ext cx="9142560" cy="64440"/>
           </a:xfrm>
           <a:prstGeom prst="rect">
             <a:avLst/>
@@ -10455,7 +10455,7 @@
         <p:spPr>
           <a:xfrm>
             <a:off x="3240" y="6400800"/>
-            <a:ext cx="9140040" cy="456480"/>
+            <a:ext cx="9139680" cy="456120"/>
           </a:xfrm>
           <a:prstGeom prst="rect">
             <a:avLst/>
@@ -10483,7 +10483,7 @@
         <p:spPr>
           <a:xfrm>
             <a:off x="0" y="6334200"/>
-            <a:ext cx="9141840" cy="62640"/>
+            <a:ext cx="9141480" cy="62280"/>
           </a:xfrm>
           <a:prstGeom prst="rect">
             <a:avLst/>
@@ -11322,8 +11322,8 @@
         </p:nvSpPr>
         <p:spPr>
           <a:xfrm>
-            <a:off x="457200" y="273240"/>
-            <a:ext cx="8228880" cy="1145160"/>
+            <a:off x="457200" y="273600"/>
+            <a:ext cx="8229240" cy="1144800"/>
           </a:xfrm>
           <a:prstGeom prst="rect">
             <a:avLst/>
@@ -11331,16 +11331,17 @@
         </p:spPr>
         <p:txBody>
           <a:bodyPr lIns="0" rIns="0" tIns="0" bIns="0" anchor="ctr">
-            <a:spAutoFit/>
-          </a:bodyPr>
-          <a:p>
-            <a:r>
-              <a:rPr b="0" lang="en-US" sz="1800" spc="-1" strike="noStrike">
+            <a:noAutofit/>
+          </a:bodyPr>
+          <a:p>
+            <a:pPr algn="ctr"/>
+            <a:r>
+              <a:rPr b="0" lang="en-US" sz="4400" spc="-1" strike="noStrike">
                 <a:latin typeface="DejaVu Sans"/>
               </a:rPr>
               <a:t>Click to edit the title text format</a:t>
             </a:r>
-            <a:endParaRPr b="0" lang="en-US" sz="1800" spc="-1" strike="noStrike">
+            <a:endParaRPr b="0" lang="en-US" sz="4400" spc="-1" strike="noStrike">
               <a:latin typeface="DejaVu Sans"/>
             </a:endParaRPr>
           </a:p>
@@ -11359,7 +11360,7 @@
         <p:spPr>
           <a:xfrm>
             <a:off x="457200" y="1604520"/>
-            <a:ext cx="8228880" cy="3976920"/>
+            <a:ext cx="8229240" cy="3977280"/>
           </a:xfrm>
           <a:prstGeom prst="rect">
             <a:avLst/>
@@ -11382,12 +11383,12 @@
               <a:buChar char=""/>
             </a:pPr>
             <a:r>
-              <a:rPr b="0" lang="en-US" sz="1800" spc="-1" strike="noStrike">
+              <a:rPr b="0" lang="en-US" sz="3200" spc="-1" strike="noStrike">
                 <a:latin typeface="DejaVu Sans"/>
               </a:rPr>
               <a:t>Click to edit the outline text format</a:t>
             </a:r>
-            <a:endParaRPr b="0" lang="en-US" sz="1800" spc="-1" strike="noStrike">
+            <a:endParaRPr b="0" lang="en-US" sz="3200" spc="-1" strike="noStrike">
               <a:latin typeface="DejaVu Sans"/>
             </a:endParaRPr>
           </a:p>
@@ -11404,12 +11405,12 @@
               <a:buChar char=""/>
             </a:pPr>
             <a:r>
-              <a:rPr b="0" lang="en-US" sz="1800" spc="-1" strike="noStrike">
+              <a:rPr b="0" lang="en-US" sz="2800" spc="-1" strike="noStrike">
                 <a:latin typeface="DejaVu Sans"/>
               </a:rPr>
               <a:t>Second Outline Level</a:t>
             </a:r>
-            <a:endParaRPr b="0" lang="en-US" sz="1800" spc="-1" strike="noStrike">
+            <a:endParaRPr b="0" lang="en-US" sz="2800" spc="-1" strike="noStrike">
               <a:latin typeface="DejaVu Sans"/>
             </a:endParaRPr>
           </a:p>
@@ -11426,12 +11427,12 @@
               <a:buChar char=""/>
             </a:pPr>
             <a:r>
-              <a:rPr b="0" lang="en-US" sz="1800" spc="-1" strike="noStrike">
+              <a:rPr b="0" lang="en-US" sz="2400" spc="-1" strike="noStrike">
                 <a:latin typeface="DejaVu Sans"/>
               </a:rPr>
               <a:t>Third Outline Level</a:t>
             </a:r>
-            <a:endParaRPr b="0" lang="en-US" sz="1800" spc="-1" strike="noStrike">
+            <a:endParaRPr b="0" lang="en-US" sz="2400" spc="-1" strike="noStrike">
               <a:latin typeface="DejaVu Sans"/>
             </a:endParaRPr>
           </a:p>
@@ -11448,12 +11449,12 @@
               <a:buChar char=""/>
             </a:pPr>
             <a:r>
-              <a:rPr b="0" lang="en-US" sz="1800" spc="-1" strike="noStrike">
+              <a:rPr b="0" lang="en-US" sz="2000" spc="-1" strike="noStrike">
                 <a:latin typeface="DejaVu Sans"/>
               </a:rPr>
               <a:t>Fourth Outline Level</a:t>
             </a:r>
-            <a:endParaRPr b="0" lang="en-US" sz="1800" spc="-1" strike="noStrike">
+            <a:endParaRPr b="0" lang="en-US" sz="2000" spc="-1" strike="noStrike">
               <a:latin typeface="DejaVu Sans"/>
             </a:endParaRPr>
           </a:p>
@@ -11470,12 +11471,12 @@
               <a:buChar char=""/>
             </a:pPr>
             <a:r>
-              <a:rPr b="0" lang="en-US" sz="1800" spc="-1" strike="noStrike">
+              <a:rPr b="0" lang="en-US" sz="2000" spc="-1" strike="noStrike">
                 <a:latin typeface="DejaVu Sans"/>
               </a:rPr>
               <a:t>Fifth Outline Level</a:t>
             </a:r>
-            <a:endParaRPr b="0" lang="en-US" sz="1800" spc="-1" strike="noStrike">
+            <a:endParaRPr b="0" lang="en-US" sz="2000" spc="-1" strike="noStrike">
               <a:latin typeface="DejaVu Sans"/>
             </a:endParaRPr>
           </a:p>
@@ -11492,12 +11493,12 @@
               <a:buChar char=""/>
             </a:pPr>
             <a:r>
-              <a:rPr b="0" lang="en-US" sz="1800" spc="-1" strike="noStrike">
+              <a:rPr b="0" lang="en-US" sz="2000" spc="-1" strike="noStrike">
                 <a:latin typeface="DejaVu Sans"/>
               </a:rPr>
               <a:t>Sixth Outline Level</a:t>
             </a:r>
-            <a:endParaRPr b="0" lang="en-US" sz="1800" spc="-1" strike="noStrike">
+            <a:endParaRPr b="0" lang="en-US" sz="2000" spc="-1" strike="noStrike">
               <a:latin typeface="DejaVu Sans"/>
             </a:endParaRPr>
           </a:p>
@@ -11514,12 +11515,12 @@
               <a:buChar char=""/>
             </a:pPr>
             <a:r>
-              <a:rPr b="0" lang="en-US" sz="1800" spc="-1" strike="noStrike">
+              <a:rPr b="0" lang="en-US" sz="2000" spc="-1" strike="noStrike">
                 <a:latin typeface="DejaVu Sans"/>
               </a:rPr>
               <a:t>Seventh Outline Level</a:t>
             </a:r>
-            <a:endParaRPr b="0" lang="en-US" sz="1800" spc="-1" strike="noStrike">
+            <a:endParaRPr b="0" lang="en-US" sz="2000" spc="-1" strike="noStrike">
               <a:latin typeface="DejaVu Sans"/>
             </a:endParaRPr>
           </a:p>
@@ -11578,7 +11579,7 @@
         <p:spPr>
           <a:xfrm>
             <a:off x="3240" y="6400800"/>
-            <a:ext cx="9140040" cy="456480"/>
+            <a:ext cx="9139680" cy="456120"/>
           </a:xfrm>
           <a:prstGeom prst="rect">
             <a:avLst/>
@@ -11606,7 +11607,7 @@
         <p:spPr>
           <a:xfrm>
             <a:off x="0" y="6334200"/>
-            <a:ext cx="9141840" cy="62640"/>
+            <a:ext cx="9141480" cy="62280"/>
           </a:xfrm>
           <a:prstGeom prst="rect">
             <a:avLst/>
@@ -11887,7 +11888,7 @@
         <p:spPr>
           <a:xfrm>
             <a:off x="533520" y="481680"/>
-            <a:ext cx="8609400" cy="1138680"/>
+            <a:ext cx="8609040" cy="1138320"/>
           </a:xfrm>
           <a:prstGeom prst="rect">
             <a:avLst/>
@@ -11949,7 +11950,7 @@
         <p:spPr>
           <a:xfrm>
             <a:off x="822960" y="1845720"/>
-            <a:ext cx="7329240" cy="4022280"/>
+            <a:ext cx="7328880" cy="4021920"/>
           </a:xfrm>
           <a:prstGeom prst="rect">
             <a:avLst/>
@@ -12022,7 +12023,7 @@
         <p:spPr>
           <a:xfrm>
             <a:off x="7425360" y="6459840"/>
-            <a:ext cx="982800" cy="363960"/>
+            <a:ext cx="982440" cy="363600"/>
           </a:xfrm>
           <a:prstGeom prst="rect">
             <a:avLst/>
@@ -12048,7 +12049,7 @@
                 <a:spcPct val="100000"/>
               </a:lnSpc>
             </a:pPr>
-            <a:fld id="{F07E9EBE-0E8B-4CE6-B837-32FA806C48EE}" type="slidenum">
+            <a:fld id="{CD1A962B-4D31-4399-9C96-F5ED3B689253}" type="slidenum">
               <a:rPr b="0" lang="en-US" sz="1050" spc="-1" strike="noStrike">
                 <a:solidFill>
                   <a:srgbClr val="ffffff"/>
@@ -12077,7 +12078,7 @@
         <p:spPr>
           <a:xfrm>
             <a:off x="822960" y="2293920"/>
-            <a:ext cx="4834440" cy="3721680"/>
+            <a:ext cx="4834080" cy="3721320"/>
           </a:xfrm>
           <a:prstGeom prst="rect">
             <a:avLst/>
@@ -12096,7 +12097,7 @@
         <p:spPr>
           <a:xfrm>
             <a:off x="6053760" y="3352680"/>
-            <a:ext cx="2742120" cy="2220840"/>
+            <a:ext cx="2741760" cy="2220840"/>
           </a:xfrm>
           <a:prstGeom prst="rect">
             <a:avLst/>
@@ -12187,7 +12188,7 @@
         <p:spPr>
           <a:xfrm>
             <a:off x="821880" y="758880"/>
-            <a:ext cx="7543080" cy="3564720"/>
+            <a:ext cx="7542720" cy="3564360"/>
           </a:xfrm>
           <a:prstGeom prst="rect">
             <a:avLst/>
@@ -12242,7 +12243,7 @@
         <p:spPr>
           <a:xfrm>
             <a:off x="7162920" y="4419720"/>
-            <a:ext cx="1696320" cy="1720080"/>
+            <a:ext cx="1695960" cy="1719720"/>
           </a:xfrm>
           <a:prstGeom prst="rect">
             <a:avLst/>
@@ -12265,7 +12266,7 @@
         <p:spPr>
           <a:xfrm>
             <a:off x="7964640" y="0"/>
-            <a:ext cx="1178640" cy="1485360"/>
+            <a:ext cx="1178280" cy="1485000"/>
           </a:xfrm>
           <a:prstGeom prst="rect">
             <a:avLst/>
@@ -12314,7 +12315,7 @@
         <p:spPr>
           <a:xfrm>
             <a:off x="821880" y="287280"/>
-            <a:ext cx="7543080" cy="1448640"/>
+            <a:ext cx="7542720" cy="1448280"/>
           </a:xfrm>
           <a:prstGeom prst="rect">
             <a:avLst/>
@@ -12365,7 +12366,7 @@
         <p:spPr>
           <a:xfrm>
             <a:off x="821880" y="1846440"/>
-            <a:ext cx="7543080" cy="4021920"/>
+            <a:ext cx="7542720" cy="4021560"/>
           </a:xfrm>
           <a:prstGeom prst="rect">
             <a:avLst/>
@@ -12386,7 +12387,7 @@
             <a:normAutofit/>
           </a:bodyPr>
           <a:p>
-            <a:pPr marL="90360" indent="-89640">
+            <a:pPr marL="90360" indent="-89280">
               <a:lnSpc>
                 <a:spcPct val="100000"/>
               </a:lnSpc>
@@ -12417,7 +12418,7 @@
             </a:endParaRPr>
           </a:p>
           <a:p>
-            <a:pPr marL="90360" indent="-89640">
+            <a:pPr marL="90360" indent="-89280">
               <a:lnSpc>
                 <a:spcPct val="100000"/>
               </a:lnSpc>
@@ -12448,7 +12449,7 @@
             </a:endParaRPr>
           </a:p>
           <a:p>
-            <a:pPr marL="90360" indent="-89640">
+            <a:pPr marL="90360" indent="-89280">
               <a:lnSpc>
                 <a:spcPct val="100000"/>
               </a:lnSpc>
@@ -12479,7 +12480,7 @@
             </a:endParaRPr>
           </a:p>
           <a:p>
-            <a:pPr marL="90360" indent="-89640">
+            <a:pPr marL="90360" indent="-89280">
               <a:lnSpc>
                 <a:spcPct val="100000"/>
               </a:lnSpc>
@@ -12510,7 +12511,7 @@
             </a:endParaRPr>
           </a:p>
           <a:p>
-            <a:pPr marL="90360" indent="-89640">
+            <a:pPr marL="90360" indent="-89280">
               <a:lnSpc>
                 <a:spcPct val="100000"/>
               </a:lnSpc>
@@ -12557,7 +12558,7 @@
             </a:endParaRPr>
           </a:p>
           <a:p>
-            <a:pPr marL="90360" indent="-89640">
+            <a:pPr marL="90360" indent="-89280">
               <a:lnSpc>
                 <a:spcPct val="100000"/>
               </a:lnSpc>
@@ -12573,7 +12574,7 @@
             </a:endParaRPr>
           </a:p>
           <a:p>
-            <a:pPr marL="90360" indent="-89640">
+            <a:pPr marL="90360" indent="-89280">
               <a:lnSpc>
                 <a:spcPct val="100000"/>
               </a:lnSpc>
@@ -12629,7 +12630,7 @@
         <p:spPr>
           <a:xfrm>
             <a:off x="457200" y="592920"/>
-            <a:ext cx="8228520" cy="824760"/>
+            <a:ext cx="8228160" cy="824400"/>
           </a:xfrm>
           <a:prstGeom prst="rect">
             <a:avLst/>
@@ -12680,7 +12681,7 @@
         <p:spPr>
           <a:xfrm>
             <a:off x="457200" y="1604520"/>
-            <a:ext cx="8228520" cy="3976560"/>
+            <a:ext cx="8228160" cy="3976200"/>
           </a:xfrm>
           <a:prstGeom prst="rect">
             <a:avLst/>
@@ -12701,7 +12702,7 @@
             <a:normAutofit/>
           </a:bodyPr>
           <a:p>
-            <a:pPr marL="90360" indent="-89640">
+            <a:pPr marL="90360" indent="-89280">
               <a:lnSpc>
                 <a:spcPct val="100000"/>
               </a:lnSpc>
@@ -12732,7 +12733,7 @@
             </a:endParaRPr>
           </a:p>
           <a:p>
-            <a:pPr marL="90360" indent="-89640">
+            <a:pPr marL="90360" indent="-89280">
               <a:lnSpc>
                 <a:spcPct val="100000"/>
               </a:lnSpc>
@@ -12763,7 +12764,7 @@
             </a:endParaRPr>
           </a:p>
           <a:p>
-            <a:pPr marL="90360" indent="-89640">
+            <a:pPr marL="90360" indent="-89280">
               <a:lnSpc>
                 <a:spcPct val="100000"/>
               </a:lnSpc>
@@ -12834,7 +12835,7 @@
         <p:spPr>
           <a:xfrm>
             <a:off x="837720" y="866520"/>
-            <a:ext cx="7543080" cy="702360"/>
+            <a:ext cx="7542720" cy="702000"/>
           </a:xfrm>
           <a:prstGeom prst="rect">
             <a:avLst/>
@@ -12885,7 +12886,7 @@
         <p:spPr>
           <a:xfrm>
             <a:off x="380880" y="1218960"/>
-            <a:ext cx="8686080" cy="5104440"/>
+            <a:ext cx="8685720" cy="5104080"/>
           </a:xfrm>
           <a:prstGeom prst="rect">
             <a:avLst/>
@@ -12938,7 +12939,7 @@
             </a:endParaRPr>
           </a:p>
           <a:p>
-            <a:pPr marL="90360" indent="-89640">
+            <a:pPr marL="90360" indent="-89280">
               <a:lnSpc>
                 <a:spcPct val="70000"/>
               </a:lnSpc>
@@ -12969,7 +12970,7 @@
             </a:endParaRPr>
           </a:p>
           <a:p>
-            <a:pPr lvl="1" marL="199800" indent="-215640">
+            <a:pPr lvl="1" marL="199800" indent="-215280">
               <a:lnSpc>
                 <a:spcPct val="70000"/>
               </a:lnSpc>
@@ -13000,7 +13001,7 @@
             </a:endParaRPr>
           </a:p>
           <a:p>
-            <a:pPr marL="90360" indent="-89640">
+            <a:pPr marL="90360" indent="-89280">
               <a:lnSpc>
                 <a:spcPct val="70000"/>
               </a:lnSpc>
@@ -13031,7 +13032,7 @@
             </a:endParaRPr>
           </a:p>
           <a:p>
-            <a:pPr lvl="1" marL="199800" indent="-215640">
+            <a:pPr lvl="1" marL="199800" indent="-215280">
               <a:lnSpc>
                 <a:spcPct val="70000"/>
               </a:lnSpc>
@@ -13062,7 +13063,7 @@
             </a:endParaRPr>
           </a:p>
           <a:p>
-            <a:pPr marL="90360" indent="-89640">
+            <a:pPr marL="90360" indent="-89280">
               <a:lnSpc>
                 <a:spcPct val="70000"/>
               </a:lnSpc>
@@ -13093,7 +13094,7 @@
             </a:endParaRPr>
           </a:p>
           <a:p>
-            <a:pPr lvl="1" marL="199800" indent="-215640">
+            <a:pPr lvl="1" marL="199800" indent="-215280">
               <a:lnSpc>
                 <a:spcPct val="70000"/>
               </a:lnSpc>
@@ -13124,7 +13125,7 @@
             </a:endParaRPr>
           </a:p>
           <a:p>
-            <a:pPr marL="90360" indent="-89640">
+            <a:pPr marL="90360" indent="-89280">
               <a:lnSpc>
                 <a:spcPct val="70000"/>
               </a:lnSpc>
@@ -13155,7 +13156,7 @@
             </a:endParaRPr>
           </a:p>
           <a:p>
-            <a:pPr lvl="1" marL="199800" indent="-215640">
+            <a:pPr lvl="1" marL="199800" indent="-215280">
               <a:lnSpc>
                 <a:spcPct val="70000"/>
               </a:lnSpc>
@@ -13186,7 +13187,7 @@
             </a:endParaRPr>
           </a:p>
           <a:p>
-            <a:pPr lvl="1" marL="199800" indent="-215640">
+            <a:pPr lvl="1" marL="199800" indent="-215280">
               <a:lnSpc>
                 <a:spcPct val="70000"/>
               </a:lnSpc>
@@ -13283,7 +13284,7 @@
         <p:spPr>
           <a:xfrm>
             <a:off x="457200" y="510120"/>
-            <a:ext cx="8228880" cy="671040"/>
+            <a:ext cx="8228520" cy="670680"/>
           </a:xfrm>
           <a:prstGeom prst="rect">
             <a:avLst/>
@@ -13311,7 +13312,11 @@
             </a:pPr>
             <a:r>
               <a:rPr b="0" lang="en-US" sz="4400" spc="-1" strike="noStrike">
+                <a:solidFill>
+                  <a:srgbClr val="000000"/>
+                </a:solidFill>
                 <a:latin typeface="DejaVu Sans"/>
+                <a:ea typeface="DejaVu Sans"/>
               </a:rPr>
               <a:t>Variables</a:t>
             </a:r>
@@ -13330,7 +13335,7 @@
         <p:spPr>
           <a:xfrm>
             <a:off x="457200" y="3566160"/>
-            <a:ext cx="8228880" cy="2015280"/>
+            <a:ext cx="8228520" cy="2014920"/>
           </a:xfrm>
           <a:prstGeom prst="rect">
             <a:avLst/>
@@ -13351,7 +13356,7 @@
             <a:normAutofit fontScale="62000"/>
           </a:bodyPr>
           <a:p>
-            <a:pPr marL="432000" indent="-323640">
+            <a:pPr marL="432000" indent="-323280">
               <a:lnSpc>
                 <a:spcPct val="100000"/>
               </a:lnSpc>
@@ -13367,7 +13372,11 @@
             </a:pPr>
             <a:r>
               <a:rPr b="0" lang="en-US" sz="3200" spc="-1" strike="noStrike">
+                <a:solidFill>
+                  <a:srgbClr val="000000"/>
+                </a:solidFill>
                 <a:latin typeface="DejaVu Sans"/>
+                <a:ea typeface="DejaVu Sans"/>
               </a:rPr>
               <a:t>Useful to accumulate values</a:t>
             </a:r>
@@ -13376,7 +13385,7 @@
             </a:endParaRPr>
           </a:p>
           <a:p>
-            <a:pPr marL="432000" indent="-323640">
+            <a:pPr marL="432000" indent="-323280">
               <a:lnSpc>
                 <a:spcPct val="100000"/>
               </a:lnSpc>
@@ -13392,7 +13401,11 @@
             </a:pPr>
             <a:r>
               <a:rPr b="0" lang="en-US" sz="3200" spc="-1" strike="noStrike">
+                <a:solidFill>
+                  <a:srgbClr val="000000"/>
+                </a:solidFill>
                 <a:latin typeface="DejaVu Sans"/>
+                <a:ea typeface="DejaVu Sans"/>
               </a:rPr>
               <a:t>Or just clarify what some particular value means</a:t>
             </a:r>
@@ -13401,7 +13414,7 @@
             </a:endParaRPr>
           </a:p>
           <a:p>
-            <a:pPr marL="432000" indent="-323640">
+            <a:pPr marL="432000" indent="-323280">
               <a:lnSpc>
                 <a:spcPct val="100000"/>
               </a:lnSpc>
@@ -13417,7 +13430,11 @@
             </a:pPr>
             <a:r>
               <a:rPr b="0" lang="en-US" sz="3200" spc="-1" strike="noStrike">
+                <a:solidFill>
+                  <a:srgbClr val="000000"/>
+                </a:solidFill>
                 <a:latin typeface="DejaVu Sans"/>
+                <a:ea typeface="DejaVu Sans"/>
               </a:rPr>
               <a:t>Use descriptive names with _ in between words</a:t>
             </a:r>
@@ -13436,7 +13453,7 @@
         <p:spPr>
           <a:xfrm>
             <a:off x="731520" y="1371600"/>
-            <a:ext cx="6217560" cy="1821240"/>
+            <a:ext cx="6217200" cy="1821240"/>
           </a:xfrm>
           <a:prstGeom prst="rect">
             <a:avLst/>
@@ -13467,7 +13484,11 @@
             </a:pPr>
             <a:r>
               <a:rPr b="0" lang="en-US" sz="1800" spc="-1" strike="noStrike">
+                <a:solidFill>
+                  <a:srgbClr val="000000"/>
+                </a:solidFill>
                 <a:latin typeface="DejaVu Sans Mono"/>
+                <a:ea typeface="DejaVu Sans"/>
               </a:rPr>
               <a:t>my_total = 17</a:t>
             </a:r>
@@ -13486,7 +13507,11 @@
             </a:pPr>
             <a:r>
               <a:rPr b="0" lang="en-US" sz="1800" spc="-1" strike="noStrike">
+                <a:solidFill>
+                  <a:srgbClr val="000000"/>
+                </a:solidFill>
                 <a:latin typeface="DejaVu Sans Mono"/>
+                <a:ea typeface="DejaVu Sans"/>
               </a:rPr>
               <a:t>... </a:t>
             </a:r>
@@ -13505,7 +13530,11 @@
             </a:pPr>
             <a:r>
               <a:rPr b="0" lang="en-US" sz="1800" spc="-1" strike="noStrike">
+                <a:solidFill>
+                  <a:srgbClr val="000000"/>
+                </a:solidFill>
                 <a:latin typeface="DejaVu Sans Mono"/>
+                <a:ea typeface="DejaVu Sans"/>
               </a:rPr>
               <a:t>my_total = my_total + 3</a:t>
             </a:r>
@@ -13521,7 +13550,11 @@
             </a:pPr>
             <a:r>
               <a:rPr b="0" lang="en-US" sz="1800" spc="-1" strike="noStrike">
+                <a:solidFill>
+                  <a:srgbClr val="000000"/>
+                </a:solidFill>
                 <a:latin typeface="DejaVu Sans Mono"/>
+                <a:ea typeface="DejaVu Sans"/>
               </a:rPr>
               <a:t>print(my_total + 3); # prints 23</a:t>
             </a:r>
@@ -13537,7 +13570,11 @@
             </a:pPr>
             <a:r>
               <a:rPr b="0" lang="en-US" sz="1800" spc="-1" strike="noStrike">
+                <a:solidFill>
+                  <a:srgbClr val="000000"/>
+                </a:solidFill>
                 <a:latin typeface="DejaVu Sans Mono"/>
+                <a:ea typeface="DejaVu Sans"/>
               </a:rPr>
               <a:t>print(my_total);     # prints 20</a:t>
             </a:r>
@@ -13586,7 +13623,7 @@
         <p:spPr>
           <a:xfrm>
             <a:off x="822240" y="287280"/>
-            <a:ext cx="7863840" cy="1448640"/>
+            <a:ext cx="7863480" cy="1448280"/>
           </a:xfrm>
           <a:prstGeom prst="rect">
             <a:avLst/>
@@ -13637,7 +13674,7 @@
         <p:spPr>
           <a:xfrm>
             <a:off x="821880" y="1846440"/>
-            <a:ext cx="7543080" cy="4401360"/>
+            <a:ext cx="7542720" cy="4401000"/>
           </a:xfrm>
           <a:prstGeom prst="rect">
             <a:avLst/>
@@ -13658,7 +13695,7 @@
             <a:normAutofit/>
           </a:bodyPr>
           <a:p>
-            <a:pPr lvl="1" marL="382320" indent="-181800">
+            <a:pPr lvl="1" marL="382320" indent="-181440">
               <a:lnSpc>
                 <a:spcPct val="80000"/>
               </a:lnSpc>
@@ -13699,7 +13736,7 @@
             </a:endParaRPr>
           </a:p>
           <a:p>
-            <a:pPr lvl="2" marL="566640" indent="-181800">
+            <a:pPr lvl="2" marL="566640" indent="-181440">
               <a:lnSpc>
                 <a:spcPct val="80000"/>
               </a:lnSpc>
@@ -13730,7 +13767,7 @@
             </a:endParaRPr>
           </a:p>
           <a:p>
-            <a:pPr lvl="2" marL="566640" indent="-181800">
+            <a:pPr lvl="2" marL="566640" indent="-181440">
               <a:lnSpc>
                 <a:spcPct val="80000"/>
               </a:lnSpc>
@@ -13761,7 +13798,7 @@
             </a:endParaRPr>
           </a:p>
           <a:p>
-            <a:pPr lvl="1" marL="382320" indent="-181800">
+            <a:pPr lvl="1" marL="382320" indent="-181440">
               <a:lnSpc>
                 <a:spcPct val="80000"/>
               </a:lnSpc>
@@ -13792,7 +13829,7 @@
             </a:endParaRPr>
           </a:p>
           <a:p>
-            <a:pPr lvl="2" marL="566640" indent="-181800">
+            <a:pPr lvl="2" marL="566640" indent="-181440">
               <a:lnSpc>
                 <a:spcPct val="80000"/>
               </a:lnSpc>
@@ -13823,7 +13860,7 @@
             </a:endParaRPr>
           </a:p>
           <a:p>
-            <a:pPr lvl="2" marL="566640" indent="-181800">
+            <a:pPr lvl="2" marL="566640" indent="-181440">
               <a:lnSpc>
                 <a:spcPct val="80000"/>
               </a:lnSpc>
@@ -13864,7 +13901,7 @@
             </a:endParaRPr>
           </a:p>
           <a:p>
-            <a:pPr lvl="1" marL="382320" indent="-181800">
+            <a:pPr lvl="1" marL="382320" indent="-181440">
               <a:lnSpc>
                 <a:spcPct val="80000"/>
               </a:lnSpc>
@@ -13895,7 +13932,7 @@
             </a:endParaRPr>
           </a:p>
           <a:p>
-            <a:pPr lvl="2" marL="566640" indent="-181800">
+            <a:pPr lvl="2" marL="566640" indent="-181440">
               <a:lnSpc>
                 <a:spcPct val="80000"/>
               </a:lnSpc>
@@ -13926,7 +13963,7 @@
             </a:endParaRPr>
           </a:p>
           <a:p>
-            <a:pPr lvl="2" marL="566640" indent="-181800">
+            <a:pPr lvl="2" marL="566640" indent="-181440">
               <a:lnSpc>
                 <a:spcPct val="80000"/>
               </a:lnSpc>
@@ -13957,7 +13994,7 @@
             </a:endParaRPr>
           </a:p>
           <a:p>
-            <a:pPr lvl="1" marL="382320" indent="-181800">
+            <a:pPr lvl="1" marL="382320" indent="-181440">
               <a:lnSpc>
                 <a:spcPct val="80000"/>
               </a:lnSpc>
@@ -13988,7 +14025,7 @@
             </a:endParaRPr>
           </a:p>
           <a:p>
-            <a:pPr lvl="2" marL="566640" indent="-181800">
+            <a:pPr lvl="2" marL="566640" indent="-181440">
               <a:lnSpc>
                 <a:spcPct val="80000"/>
               </a:lnSpc>
@@ -14107,7 +14144,7 @@
         <p:spPr>
           <a:xfrm>
             <a:off x="-360" y="-204840"/>
-            <a:ext cx="7543080" cy="1294560"/>
+            <a:ext cx="7542720" cy="1294200"/>
           </a:xfrm>
           <a:prstGeom prst="rect">
             <a:avLst/>
@@ -14158,7 +14195,7 @@
         <p:spPr>
           <a:xfrm>
             <a:off x="380520" y="1258920"/>
-            <a:ext cx="4038120" cy="4037760"/>
+            <a:ext cx="4037760" cy="4037400"/>
           </a:xfrm>
           <a:prstGeom prst="rect">
             <a:avLst/>
@@ -14182,7 +14219,7 @@
             <a:normAutofit/>
           </a:bodyPr>
           <a:p>
-            <a:pPr marL="90360" indent="-89640">
+            <a:pPr marL="90360" indent="-89280">
               <a:lnSpc>
                 <a:spcPct val="80000"/>
               </a:lnSpc>
@@ -14213,7 +14250,7 @@
             </a:endParaRPr>
           </a:p>
           <a:p>
-            <a:pPr marL="90360" indent="-89640">
+            <a:pPr marL="90360" indent="-89280">
               <a:lnSpc>
                 <a:spcPct val="80000"/>
               </a:lnSpc>
@@ -14244,7 +14281,7 @@
             </a:endParaRPr>
           </a:p>
           <a:p>
-            <a:pPr marL="90360" indent="-89640">
+            <a:pPr marL="90360" indent="-89280">
               <a:lnSpc>
                 <a:spcPct val="80000"/>
               </a:lnSpc>
@@ -14275,7 +14312,7 @@
             </a:endParaRPr>
           </a:p>
           <a:p>
-            <a:pPr marL="90360" indent="-89640">
+            <a:pPr marL="90360" indent="-89280">
               <a:lnSpc>
                 <a:spcPct val="80000"/>
               </a:lnSpc>
@@ -14306,7 +14343,7 @@
             </a:endParaRPr>
           </a:p>
           <a:p>
-            <a:pPr marL="90360" indent="-89640">
+            <a:pPr marL="90360" indent="-89280">
               <a:lnSpc>
                 <a:spcPct val="80000"/>
               </a:lnSpc>
@@ -14347,7 +14384,7 @@
             </a:endParaRPr>
           </a:p>
           <a:p>
-            <a:pPr marL="90360" indent="-89640">
+            <a:pPr marL="90360" indent="-89280">
               <a:lnSpc>
                 <a:spcPct val="80000"/>
               </a:lnSpc>
@@ -14388,7 +14425,7 @@
             </a:endParaRPr>
           </a:p>
           <a:p>
-            <a:pPr marL="90360" indent="-89640">
+            <a:pPr marL="90360" indent="-89280">
               <a:lnSpc>
                 <a:spcPct val="80000"/>
               </a:lnSpc>
@@ -14429,7 +14466,7 @@
             </a:endParaRPr>
           </a:p>
           <a:p>
-            <a:pPr marL="90360" indent="-89640">
+            <a:pPr marL="90360" indent="-89280">
               <a:lnSpc>
                 <a:spcPct val="80000"/>
               </a:lnSpc>
@@ -14460,7 +14497,7 @@
             </a:endParaRPr>
           </a:p>
           <a:p>
-            <a:pPr marL="90360" indent="-89640">
+            <a:pPr marL="90360" indent="-89280">
               <a:lnSpc>
                 <a:spcPct val="80000"/>
               </a:lnSpc>
@@ -14549,7 +14586,7 @@
         <p:spPr>
           <a:xfrm>
             <a:off x="4952520" y="1303200"/>
-            <a:ext cx="4038120" cy="4011120"/>
+            <a:ext cx="4037760" cy="4010760"/>
           </a:xfrm>
           <a:prstGeom prst="rect">
             <a:avLst/>
@@ -14573,7 +14610,7 @@
             <a:normAutofit/>
           </a:bodyPr>
           <a:p>
-            <a:pPr marL="90360" indent="-89640">
+            <a:pPr marL="90360" indent="-89280">
               <a:lnSpc>
                 <a:spcPct val="90000"/>
               </a:lnSpc>
@@ -14625,7 +14662,7 @@
             </a:endParaRPr>
           </a:p>
           <a:p>
-            <a:pPr marL="90360" indent="-89640">
+            <a:pPr marL="90360" indent="-89280">
               <a:lnSpc>
                 <a:spcPct val="90000"/>
               </a:lnSpc>
@@ -14666,7 +14703,7 @@
             </a:endParaRPr>
           </a:p>
           <a:p>
-            <a:pPr marL="90360" indent="-89640">
+            <a:pPr marL="90360" indent="-89280">
               <a:lnSpc>
                 <a:spcPct val="90000"/>
               </a:lnSpc>
@@ -14697,7 +14734,7 @@
             </a:endParaRPr>
           </a:p>
           <a:p>
-            <a:pPr marL="90360" indent="-89640">
+            <a:pPr marL="90360" indent="-89280">
               <a:lnSpc>
                 <a:spcPct val="90000"/>
               </a:lnSpc>
@@ -14728,7 +14765,7 @@
             </a:endParaRPr>
           </a:p>
           <a:p>
-            <a:pPr marL="90360" indent="-89640">
+            <a:pPr marL="90360" indent="-89280">
               <a:lnSpc>
                 <a:spcPct val="90000"/>
               </a:lnSpc>
@@ -14759,7 +14796,7 @@
             </a:endParaRPr>
           </a:p>
           <a:p>
-            <a:pPr marL="90360" indent="-89640">
+            <a:pPr marL="90360" indent="-89280">
               <a:lnSpc>
                 <a:spcPct val="90000"/>
               </a:lnSpc>
@@ -14800,7 +14837,7 @@
         <p:spPr>
           <a:xfrm>
             <a:off x="531720" y="5465880"/>
-            <a:ext cx="7848000" cy="703080"/>
+            <a:ext cx="7847640" cy="703080"/>
           </a:xfrm>
           <a:custGeom>
             <a:avLst/>
@@ -15441,7 +15478,7 @@
         <p:spPr>
           <a:xfrm>
             <a:off x="821880" y="287280"/>
-            <a:ext cx="7543080" cy="1448640"/>
+            <a:ext cx="7542720" cy="1448280"/>
           </a:xfrm>
           <a:prstGeom prst="rect">
             <a:avLst/>
@@ -15512,7 +15549,7 @@
         <p:spPr>
           <a:xfrm>
             <a:off x="822240" y="1846440"/>
-            <a:ext cx="7940160" cy="4021920"/>
+            <a:ext cx="7939800" cy="4021560"/>
           </a:xfrm>
           <a:prstGeom prst="rect">
             <a:avLst/>
@@ -15533,7 +15570,7 @@
             <a:normAutofit/>
           </a:bodyPr>
           <a:p>
-            <a:pPr marL="90360" indent="-89640">
+            <a:pPr marL="90360" indent="-89280">
               <a:lnSpc>
                 <a:spcPct val="100000"/>
               </a:lnSpc>
@@ -15564,7 +15601,7 @@
             </a:endParaRPr>
           </a:p>
           <a:p>
-            <a:pPr lvl="1" marL="382320" indent="-181800">
+            <a:pPr lvl="1" marL="382320" indent="-181440">
               <a:lnSpc>
                 <a:spcPct val="100000"/>
               </a:lnSpc>
@@ -15595,7 +15632,7 @@
             </a:endParaRPr>
           </a:p>
           <a:p>
-            <a:pPr lvl="1" marL="382320" indent="-181800">
+            <a:pPr lvl="1" marL="382320" indent="-181440">
               <a:lnSpc>
                 <a:spcPct val="100000"/>
               </a:lnSpc>
@@ -15657,7 +15694,7 @@
             </a:endParaRPr>
           </a:p>
           <a:p>
-            <a:pPr marL="90360" indent="-89640">
+            <a:pPr marL="90360" indent="-89280">
               <a:lnSpc>
                 <a:spcPct val="100000"/>
               </a:lnSpc>
@@ -15688,7 +15725,7 @@
             </a:endParaRPr>
           </a:p>
           <a:p>
-            <a:pPr lvl="1" marL="382320" indent="-181800">
+            <a:pPr lvl="1" marL="382320" indent="-181440">
               <a:lnSpc>
                 <a:spcPct val="100000"/>
               </a:lnSpc>
@@ -15729,7 +15766,7 @@
             </a:endParaRPr>
           </a:p>
           <a:p>
-            <a:pPr lvl="1" marL="382320" indent="-181800">
+            <a:pPr lvl="1" marL="382320" indent="-181440">
               <a:lnSpc>
                 <a:spcPct val="90000"/>
               </a:lnSpc>
@@ -15836,7 +15873,7 @@
         <p:spPr>
           <a:xfrm>
             <a:off x="821880" y="287280"/>
-            <a:ext cx="7543080" cy="1448640"/>
+            <a:ext cx="7542720" cy="1448280"/>
           </a:xfrm>
           <a:prstGeom prst="rect">
             <a:avLst/>
@@ -15907,7 +15944,7 @@
         <p:spPr>
           <a:xfrm>
             <a:off x="821880" y="1846440"/>
-            <a:ext cx="7543080" cy="4021920"/>
+            <a:ext cx="7542720" cy="4021560"/>
           </a:xfrm>
           <a:prstGeom prst="rect">
             <a:avLst/>
@@ -15928,7 +15965,7 @@
             <a:normAutofit/>
           </a:bodyPr>
           <a:p>
-            <a:pPr marL="90360" indent="-89640">
+            <a:pPr marL="90360" indent="-89280">
               <a:lnSpc>
                 <a:spcPct val="100000"/>
               </a:lnSpc>
@@ -16091,8 +16128,8 @@
         </p:nvSpPr>
         <p:spPr>
           <a:xfrm>
-            <a:off x="457200" y="-137880"/>
-            <a:ext cx="8228520" cy="1555560"/>
+            <a:off x="457200" y="-138240"/>
+            <a:ext cx="8228160" cy="1555560"/>
           </a:xfrm>
           <a:prstGeom prst="rect">
             <a:avLst/>
@@ -16143,7 +16180,7 @@
         <p:spPr>
           <a:xfrm>
             <a:off x="457200" y="1604520"/>
-            <a:ext cx="8228520" cy="3976560"/>
+            <a:ext cx="8228160" cy="3976200"/>
           </a:xfrm>
           <a:prstGeom prst="rect">
             <a:avLst/>
@@ -16164,7 +16201,7 @@
             <a:normAutofit/>
           </a:bodyPr>
           <a:p>
-            <a:pPr marL="90360" indent="-89640">
+            <a:pPr marL="90360" indent="-89280">
               <a:lnSpc>
                 <a:spcPct val="100000"/>
               </a:lnSpc>
@@ -16195,7 +16232,7 @@
             </a:endParaRPr>
           </a:p>
           <a:p>
-            <a:pPr marL="90360" indent="-89640">
+            <a:pPr marL="90360" indent="-89280">
               <a:lnSpc>
                 <a:spcPct val="100000"/>
               </a:lnSpc>
@@ -16226,7 +16263,7 @@
             </a:endParaRPr>
           </a:p>
           <a:p>
-            <a:pPr marL="90360" indent="-89640">
+            <a:pPr marL="90360" indent="-89280">
               <a:lnSpc>
                 <a:spcPct val="100000"/>
               </a:lnSpc>
@@ -16257,7 +16294,7 @@
             </a:endParaRPr>
           </a:p>
           <a:p>
-            <a:pPr marL="90360" indent="-89640">
+            <a:pPr marL="90360" indent="-89280">
               <a:lnSpc>
                 <a:spcPct val="100000"/>
               </a:lnSpc>
@@ -16328,7 +16365,7 @@
         <p:spPr>
           <a:xfrm>
             <a:off x="822960" y="286560"/>
-            <a:ext cx="7542720" cy="1449720"/>
+            <a:ext cx="7542360" cy="1449360"/>
           </a:xfrm>
           <a:prstGeom prst="rect">
             <a:avLst/>
@@ -16379,7 +16416,7 @@
         <p:spPr>
           <a:xfrm>
             <a:off x="822960" y="1845720"/>
-            <a:ext cx="7542720" cy="4022280"/>
+            <a:ext cx="7542360" cy="4021920"/>
           </a:xfrm>
           <a:prstGeom prst="rect">
             <a:avLst/>
@@ -16400,7 +16437,7 @@
             <a:noAutofit/>
           </a:bodyPr>
           <a:p>
-            <a:pPr marL="91440" indent="-90360">
+            <a:pPr marL="91440" indent="-90000">
               <a:lnSpc>
                 <a:spcPct val="90000"/>
               </a:lnSpc>
@@ -16447,7 +16484,7 @@
             </a:endParaRPr>
           </a:p>
           <a:p>
-            <a:pPr marL="91440" indent="-90360">
+            <a:pPr marL="91440" indent="-90000">
               <a:lnSpc>
                 <a:spcPct val="90000"/>
               </a:lnSpc>
@@ -16494,7 +16531,7 @@
             </a:endParaRPr>
           </a:p>
           <a:p>
-            <a:pPr marL="91440" indent="-90360">
+            <a:pPr marL="91440" indent="-90000">
               <a:lnSpc>
                 <a:spcPct val="90000"/>
               </a:lnSpc>
@@ -16525,7 +16562,7 @@
             </a:endParaRPr>
           </a:p>
           <a:p>
-            <a:pPr lvl="1" marL="384120" indent="-181800">
+            <a:pPr lvl="1" marL="384120" indent="-181440">
               <a:lnSpc>
                 <a:spcPct val="90000"/>
               </a:lnSpc>
@@ -16566,7 +16603,7 @@
         <p:spPr>
           <a:xfrm>
             <a:off x="7425360" y="6459840"/>
-            <a:ext cx="982800" cy="363960"/>
+            <a:ext cx="982440" cy="363600"/>
           </a:xfrm>
           <a:prstGeom prst="rect">
             <a:avLst/>
@@ -16592,7 +16629,7 @@
                 <a:spcPct val="100000"/>
               </a:lnSpc>
             </a:pPr>
-            <a:fld id="{AA98C1C8-53C6-46EF-8F72-A8914193D0AE}" type="slidenum">
+            <a:fld id="{977A33D9-5DFF-4019-8A50-5E41AD798661}" type="slidenum">
               <a:rPr b="0" lang="en-US" sz="1050" spc="-1" strike="noStrike">
                 <a:solidFill>
                   <a:srgbClr val="ffffff"/>
@@ -16647,7 +16684,7 @@
         <p:spPr>
           <a:xfrm>
             <a:off x="821880" y="287280"/>
-            <a:ext cx="7543080" cy="1448640"/>
+            <a:ext cx="7542720" cy="1448280"/>
           </a:xfrm>
           <a:prstGeom prst="rect">
             <a:avLst/>
@@ -16698,7 +16735,7 @@
         <p:spPr>
           <a:xfrm>
             <a:off x="821880" y="1846440"/>
-            <a:ext cx="7543080" cy="4021920"/>
+            <a:ext cx="7542720" cy="4021560"/>
           </a:xfrm>
           <a:prstGeom prst="rect">
             <a:avLst/>
@@ -16719,7 +16756,7 @@
             <a:normAutofit fontScale="75000"/>
           </a:bodyPr>
           <a:p>
-            <a:pPr marL="90360" indent="-89640">
+            <a:pPr marL="90360" indent="-89280">
               <a:lnSpc>
                 <a:spcPct val="100000"/>
               </a:lnSpc>
@@ -16766,7 +16803,7 @@
             </a:endParaRPr>
           </a:p>
           <a:p>
-            <a:pPr marL="90360" indent="-89640">
+            <a:pPr marL="90360" indent="-89280">
               <a:lnSpc>
                 <a:spcPct val="100000"/>
               </a:lnSpc>
@@ -16817,7 +16854,7 @@
             </a:endParaRPr>
           </a:p>
           <a:p>
-            <a:pPr marL="90360" indent="-89640">
+            <a:pPr marL="90360" indent="-89280">
               <a:lnSpc>
                 <a:spcPct val="100000"/>
               </a:lnSpc>
@@ -16858,7 +16895,7 @@
             </a:endParaRPr>
           </a:p>
           <a:p>
-            <a:pPr marL="90360" indent="-89640">
+            <a:pPr marL="90360" indent="-89280">
               <a:lnSpc>
                 <a:spcPct val="100000"/>
               </a:lnSpc>
@@ -16889,7 +16926,7 @@
             </a:endParaRPr>
           </a:p>
           <a:p>
-            <a:pPr marL="90360" indent="-89640">
+            <a:pPr marL="90360" indent="-89280">
               <a:lnSpc>
                 <a:spcPct val="100000"/>
               </a:lnSpc>
@@ -16960,7 +16997,7 @@
         <p:spPr>
           <a:xfrm>
             <a:off x="457200" y="510120"/>
-            <a:ext cx="8228880" cy="671040"/>
+            <a:ext cx="8228520" cy="670680"/>
           </a:xfrm>
           <a:prstGeom prst="rect">
             <a:avLst/>
@@ -16988,7 +17025,11 @@
             </a:pPr>
             <a:r>
               <a:rPr b="0" lang="en-US" sz="4400" spc="-1" strike="noStrike">
+                <a:solidFill>
+                  <a:srgbClr val="000000"/>
+                </a:solidFill>
                 <a:latin typeface="DejaVu Sans"/>
+                <a:ea typeface="DejaVu Sans"/>
               </a:rPr>
               <a:t>Live Coding: Dog Bark </a:t>
             </a:r>
@@ -17007,7 +17048,7 @@
         <p:spPr>
           <a:xfrm>
             <a:off x="457200" y="1604520"/>
-            <a:ext cx="8228880" cy="3976920"/>
+            <a:ext cx="8228520" cy="3976560"/>
           </a:xfrm>
           <a:prstGeom prst="rect">
             <a:avLst/>
@@ -17028,7 +17069,7 @@
             <a:normAutofit/>
           </a:bodyPr>
           <a:p>
-            <a:pPr marL="432000" indent="-323640">
+            <a:pPr marL="432000" indent="-323280">
               <a:lnSpc>
                 <a:spcPct val="100000"/>
               </a:lnSpc>
@@ -17044,7 +17085,40 @@
             </a:pPr>
             <a:r>
               <a:rPr b="0" lang="en-US" sz="3200" spc="-1" strike="noStrike">
+                <a:solidFill>
+                  <a:srgbClr val="000000"/>
+                </a:solidFill>
                 <a:latin typeface="DejaVu Sans"/>
+                <a:ea typeface="DejaVu Sans"/>
+              </a:rPr>
+              <a:t>We’ll do this one together</a:t>
+            </a:r>
+            <a:endParaRPr b="0" lang="en-US" sz="3200" spc="-1" strike="noStrike">
+              <a:latin typeface="DejaVu Sans"/>
+            </a:endParaRPr>
+          </a:p>
+          <a:p>
+            <a:pPr marL="432000" indent="-323280">
+              <a:lnSpc>
+                <a:spcPct val="100000"/>
+              </a:lnSpc>
+              <a:spcBef>
+                <a:spcPts val="1417"/>
+              </a:spcBef>
+              <a:buClr>
+                <a:srgbClr val="000000"/>
+              </a:buClr>
+              <a:buSzPct val="45000"/>
+              <a:buFont typeface="Wingdings" charset="2"/>
+              <a:buChar char=""/>
+            </a:pPr>
+            <a:r>
+              <a:rPr b="0" lang="en-US" sz="3200" spc="-1" strike="noStrike">
+                <a:solidFill>
+                  <a:srgbClr val="000000"/>
+                </a:solidFill>
+                <a:latin typeface="DejaVu Sans"/>
+                <a:ea typeface="DejaVu Sans"/>
               </a:rPr>
               <a:t>Images, text, and sounds</a:t>
             </a:r>
@@ -17093,7 +17167,7 @@
         <p:spPr>
           <a:xfrm>
             <a:off x="457200" y="510120"/>
-            <a:ext cx="8228880" cy="671040"/>
+            <a:ext cx="8228520" cy="670680"/>
           </a:xfrm>
           <a:prstGeom prst="rect">
             <a:avLst/>
@@ -17121,7 +17195,11 @@
             </a:pPr>
             <a:r>
               <a:rPr b="0" lang="en-US" sz="4400" spc="-1" strike="noStrike">
+                <a:solidFill>
+                  <a:srgbClr val="000000"/>
+                </a:solidFill>
                 <a:latin typeface="DejaVu Sans"/>
+                <a:ea typeface="DejaVu Sans"/>
               </a:rPr>
               <a:t>Expanding Moving Smile</a:t>
             </a:r>
@@ -17140,7 +17218,7 @@
         <p:spPr>
           <a:xfrm>
             <a:off x="457200" y="1604520"/>
-            <a:ext cx="8228880" cy="3976920"/>
+            <a:ext cx="8228520" cy="3976560"/>
           </a:xfrm>
           <a:prstGeom prst="rect">
             <a:avLst/>
@@ -17161,7 +17239,7 @@
             <a:normAutofit/>
           </a:bodyPr>
           <a:p>
-            <a:pPr marL="432000" indent="-323640">
+            <a:pPr marL="432000" indent="-323280">
               <a:lnSpc>
                 <a:spcPct val="100000"/>
               </a:lnSpc>
@@ -17177,7 +17255,11 @@
             </a:pPr>
             <a:r>
               <a:rPr b="0" lang="en-US" sz="3200" spc="-1" strike="noStrike">
+                <a:solidFill>
+                  <a:srgbClr val="000000"/>
+                </a:solidFill>
                 <a:latin typeface="DejaVu Sans"/>
+                <a:ea typeface="DejaVu Sans"/>
               </a:rPr>
               <a:t>Add sounds, text, images, new features</a:t>
             </a:r>
@@ -17226,7 +17308,7 @@
         <p:spPr>
           <a:xfrm>
             <a:off x="822960" y="286560"/>
-            <a:ext cx="7542720" cy="1449720"/>
+            <a:ext cx="7542360" cy="1449360"/>
           </a:xfrm>
           <a:prstGeom prst="rect">
             <a:avLst/>
@@ -17277,7 +17359,7 @@
         <p:spPr>
           <a:xfrm>
             <a:off x="7425360" y="6459840"/>
-            <a:ext cx="982800" cy="363960"/>
+            <a:ext cx="982440" cy="363600"/>
           </a:xfrm>
           <a:prstGeom prst="rect">
             <a:avLst/>
@@ -17303,7 +17385,7 @@
                 <a:spcPct val="100000"/>
               </a:lnSpc>
             </a:pPr>
-            <a:fld id="{6005BE59-6431-4A7A-B8F3-E7C512EDFEA0}" type="slidenum">
+            <a:fld id="{C5636D57-EAA1-4AFF-A62C-B0F09E6CD8DA}" type="slidenum">
               <a:rPr b="0" lang="en-US" sz="1050" spc="-1" strike="noStrike">
                 <a:solidFill>
                   <a:srgbClr val="ffffff"/>
@@ -17332,7 +17414,7 @@
         <p:spPr>
           <a:xfrm>
             <a:off x="7317360" y="38520"/>
-            <a:ext cx="1621440" cy="1643400"/>
+            <a:ext cx="1621080" cy="1643040"/>
           </a:xfrm>
           <a:prstGeom prst="rect">
             <a:avLst/>
@@ -17351,7 +17433,7 @@
         <p:spPr>
           <a:xfrm>
             <a:off x="3505320" y="2305440"/>
-            <a:ext cx="4418640" cy="1461240"/>
+            <a:ext cx="4418280" cy="1461240"/>
           </a:xfrm>
           <a:prstGeom prst="rect">
             <a:avLst/>
@@ -17472,7 +17554,7 @@
         <p:spPr>
           <a:xfrm>
             <a:off x="628200" y="4598640"/>
-            <a:ext cx="3010320" cy="942120"/>
+            <a:ext cx="3009960" cy="942120"/>
           </a:xfrm>
           <a:prstGeom prst="rect">
             <a:avLst/>
@@ -17583,7 +17665,7 @@
         <p:spPr>
           <a:xfrm>
             <a:off x="4971240" y="4598640"/>
-            <a:ext cx="3010320" cy="942120"/>
+            <a:ext cx="3009960" cy="942120"/>
           </a:xfrm>
           <a:prstGeom prst="rect">
             <a:avLst/>
@@ -17766,7 +17848,7 @@
         <p:spPr>
           <a:xfrm>
             <a:off x="1097280" y="1920240"/>
-            <a:ext cx="2010960" cy="1908000"/>
+            <a:ext cx="2010600" cy="1907640"/>
           </a:xfrm>
           <a:prstGeom prst="rect">
             <a:avLst/>
@@ -17785,7 +17867,7 @@
         <p:spPr>
           <a:xfrm>
             <a:off x="3017520" y="3931920"/>
-            <a:ext cx="2193840" cy="456480"/>
+            <a:ext cx="2193480" cy="456120"/>
           </a:xfrm>
           <a:prstGeom prst="wedgeRoundRectCallout">
             <a:avLst>
@@ -17878,7 +17960,7 @@
         <p:spPr>
           <a:xfrm>
             <a:off x="6675120" y="3383280"/>
-            <a:ext cx="3108240" cy="2818440"/>
+            <a:ext cx="3107880" cy="2818080"/>
           </a:xfrm>
           <a:prstGeom prst="rect">
             <a:avLst/>
@@ -17897,7 +17979,7 @@
         <p:spPr>
           <a:xfrm>
             <a:off x="822960" y="286560"/>
-            <a:ext cx="7542720" cy="1449720"/>
+            <a:ext cx="7542360" cy="1449360"/>
           </a:xfrm>
           <a:prstGeom prst="rect">
             <a:avLst/>
@@ -17948,7 +18030,7 @@
         <p:spPr>
           <a:xfrm>
             <a:off x="646200" y="1814040"/>
-            <a:ext cx="8348400" cy="3580200"/>
+            <a:ext cx="8348040" cy="3579840"/>
           </a:xfrm>
           <a:prstGeom prst="rect">
             <a:avLst/>
@@ -17969,7 +18051,7 @@
             <a:normAutofit/>
           </a:bodyPr>
           <a:p>
-            <a:pPr marL="91440" indent="-90360">
+            <a:pPr marL="91440" indent="-90000">
               <a:lnSpc>
                 <a:spcPct val="90000"/>
               </a:lnSpc>
@@ -18016,7 +18098,7 @@
             </a:endParaRPr>
           </a:p>
           <a:p>
-            <a:pPr marL="91440" indent="-90360">
+            <a:pPr marL="91440" indent="-90000">
               <a:lnSpc>
                 <a:spcPct val="90000"/>
               </a:lnSpc>
@@ -18063,7 +18145,7 @@
             </a:endParaRPr>
           </a:p>
           <a:p>
-            <a:pPr marL="91440" indent="-90360">
+            <a:pPr marL="91440" indent="-90000">
               <a:lnSpc>
                 <a:spcPct val="90000"/>
               </a:lnSpc>
@@ -18110,7 +18192,7 @@
             </a:endParaRPr>
           </a:p>
           <a:p>
-            <a:pPr marL="91440" indent="-90360">
+            <a:pPr marL="91440" indent="-90000">
               <a:lnSpc>
                 <a:spcPct val="90000"/>
               </a:lnSpc>
@@ -18151,7 +18233,7 @@
         <p:spPr>
           <a:xfrm>
             <a:off x="7425360" y="6459840"/>
-            <a:ext cx="982800" cy="363960"/>
+            <a:ext cx="982440" cy="363600"/>
           </a:xfrm>
           <a:prstGeom prst="rect">
             <a:avLst/>
@@ -18177,7 +18259,7 @@
                 <a:spcPct val="100000"/>
               </a:lnSpc>
             </a:pPr>
-            <a:fld id="{94C34D67-FA9E-4B5A-8DC6-951625180968}" type="slidenum">
+            <a:fld id="{BD1A1A65-86FA-48A2-81BC-4DD8F44054C6}" type="slidenum">
               <a:rPr b="0" lang="en-US" sz="1050" spc="-1" strike="noStrike">
                 <a:solidFill>
                   <a:srgbClr val="ffffff"/>
@@ -18232,7 +18314,7 @@
         <p:spPr>
           <a:xfrm>
             <a:off x="822960" y="286560"/>
-            <a:ext cx="7542720" cy="1449720"/>
+            <a:ext cx="7542360" cy="1449360"/>
           </a:xfrm>
           <a:prstGeom prst="rect">
             <a:avLst/>
@@ -18283,7 +18365,7 @@
         <p:spPr>
           <a:xfrm>
             <a:off x="822960" y="1845720"/>
-            <a:ext cx="7542720" cy="4022280"/>
+            <a:ext cx="7542360" cy="4021920"/>
           </a:xfrm>
           <a:prstGeom prst="rect">
             <a:avLst/>
@@ -18304,7 +18386,7 @@
             <a:noAutofit/>
           </a:bodyPr>
           <a:p>
-            <a:pPr marL="91440" indent="-90360">
+            <a:pPr marL="91440" indent="-90000">
               <a:lnSpc>
                 <a:spcPct val="90000"/>
               </a:lnSpc>
@@ -18358,7 +18440,7 @@
             </a:endParaRPr>
           </a:p>
           <a:p>
-            <a:pPr marL="91440" indent="-90360">
+            <a:pPr marL="91440" indent="-90000">
               <a:lnSpc>
                 <a:spcPct val="90000"/>
               </a:lnSpc>
@@ -18389,7 +18471,7 @@
             </a:endParaRPr>
           </a:p>
           <a:p>
-            <a:pPr marL="91440" indent="-90360">
+            <a:pPr marL="91440" indent="-90000">
               <a:lnSpc>
                 <a:spcPct val="90000"/>
               </a:lnSpc>
@@ -18430,7 +18512,7 @@
         <p:spPr>
           <a:xfrm>
             <a:off x="7425360" y="6459840"/>
-            <a:ext cx="982800" cy="363960"/>
+            <a:ext cx="982440" cy="363600"/>
           </a:xfrm>
           <a:prstGeom prst="rect">
             <a:avLst/>
@@ -18456,7 +18538,7 @@
                 <a:spcPct val="100000"/>
               </a:lnSpc>
             </a:pPr>
-            <a:fld id="{7458B2B5-9308-473D-9D41-DDF7D49DED19}" type="slidenum">
+            <a:fld id="{A221BCA2-B549-407B-8EFF-1F80FA94A3FE}" type="slidenum">
               <a:rPr b="0" lang="en-US" sz="1050" spc="-1" strike="noStrike">
                 <a:solidFill>
                   <a:srgbClr val="ffffff"/>
@@ -18511,7 +18593,7 @@
         <p:spPr>
           <a:xfrm>
             <a:off x="822960" y="286560"/>
-            <a:ext cx="7542720" cy="1449720"/>
+            <a:ext cx="7542360" cy="1449360"/>
           </a:xfrm>
           <a:prstGeom prst="rect">
             <a:avLst/>
@@ -18612,7 +18694,7 @@
         <p:spPr>
           <a:xfrm>
             <a:off x="822960" y="1845720"/>
-            <a:ext cx="7542720" cy="4022280"/>
+            <a:ext cx="7542360" cy="4021920"/>
           </a:xfrm>
           <a:prstGeom prst="rect">
             <a:avLst/>
@@ -18633,7 +18715,7 @@
             <a:normAutofit/>
           </a:bodyPr>
           <a:p>
-            <a:pPr marL="91440" indent="-90360">
+            <a:pPr marL="91440" indent="-90000">
               <a:lnSpc>
                 <a:spcPct val="90000"/>
               </a:lnSpc>
@@ -18674,7 +18756,7 @@
             </a:endParaRPr>
           </a:p>
           <a:p>
-            <a:pPr lvl="1" marL="384120" indent="-181800">
+            <a:pPr lvl="1" marL="384120" indent="-181440">
               <a:lnSpc>
                 <a:spcPct val="90000"/>
               </a:lnSpc>
@@ -18715,7 +18797,7 @@
             </a:endParaRPr>
           </a:p>
           <a:p>
-            <a:pPr lvl="1" marL="384120" indent="-181800">
+            <a:pPr lvl="1" marL="384120" indent="-181440">
               <a:lnSpc>
                 <a:spcPct val="90000"/>
               </a:lnSpc>
@@ -18756,7 +18838,7 @@
             </a:endParaRPr>
           </a:p>
           <a:p>
-            <a:pPr lvl="1" marL="384120" indent="-181800">
+            <a:pPr lvl="1" marL="384120" indent="-181440">
               <a:lnSpc>
                 <a:spcPct val="90000"/>
               </a:lnSpc>
@@ -18829,7 +18911,7 @@
         <p:spPr>
           <a:xfrm>
             <a:off x="7425360" y="6459840"/>
-            <a:ext cx="982800" cy="363960"/>
+            <a:ext cx="982440" cy="363600"/>
           </a:xfrm>
           <a:prstGeom prst="rect">
             <a:avLst/>
@@ -18855,7 +18937,7 @@
                 <a:spcPct val="100000"/>
               </a:lnSpc>
             </a:pPr>
-            <a:fld id="{99745B1E-B166-453F-8ED2-22FF92C4FB7B}" type="slidenum">
+            <a:fld id="{26EA2E26-A714-4219-85DB-E3D5AE5A987A}" type="slidenum">
               <a:rPr b="0" lang="en-US" sz="1050" spc="-1" strike="noStrike">
                 <a:solidFill>
                   <a:srgbClr val="ffffff"/>
@@ -18910,7 +18992,7 @@
         <p:spPr>
           <a:xfrm>
             <a:off x="822960" y="286560"/>
-            <a:ext cx="7542720" cy="1449720"/>
+            <a:ext cx="7542360" cy="1449360"/>
           </a:xfrm>
           <a:prstGeom prst="rect">
             <a:avLst/>
@@ -19011,7 +19093,7 @@
         <p:spPr>
           <a:xfrm>
             <a:off x="822960" y="1845720"/>
-            <a:ext cx="7542720" cy="4022280"/>
+            <a:ext cx="7542360" cy="4021920"/>
           </a:xfrm>
           <a:prstGeom prst="rect">
             <a:avLst/>
@@ -19032,7 +19114,7 @@
             <a:normAutofit/>
           </a:bodyPr>
           <a:p>
-            <a:pPr marL="91440" indent="-90360">
+            <a:pPr marL="91440" indent="-90000">
               <a:lnSpc>
                 <a:spcPct val="90000"/>
               </a:lnSpc>
@@ -19073,7 +19155,7 @@
             </a:endParaRPr>
           </a:p>
           <a:p>
-            <a:pPr lvl="1" marL="384120" indent="-181800">
+            <a:pPr lvl="1" marL="384120" indent="-181440">
               <a:lnSpc>
                 <a:spcPct val="90000"/>
               </a:lnSpc>
@@ -19114,7 +19196,7 @@
             </a:endParaRPr>
           </a:p>
           <a:p>
-            <a:pPr marL="91440" indent="-90360">
+            <a:pPr marL="91440" indent="-90000">
               <a:lnSpc>
                 <a:spcPct val="90000"/>
               </a:lnSpc>
@@ -19155,7 +19237,7 @@
             </a:endParaRPr>
           </a:p>
           <a:p>
-            <a:pPr lvl="1" marL="384120" indent="-181800">
+            <a:pPr lvl="1" marL="384120" indent="-181440">
               <a:lnSpc>
                 <a:spcPct val="90000"/>
               </a:lnSpc>
@@ -19196,7 +19278,7 @@
             </a:endParaRPr>
           </a:p>
           <a:p>
-            <a:pPr lvl="1" marL="384120" indent="-181800">
+            <a:pPr lvl="1" marL="384120" indent="-181440">
               <a:lnSpc>
                 <a:spcPct val="90000"/>
               </a:lnSpc>
@@ -19237,7 +19319,7 @@
             </a:endParaRPr>
           </a:p>
           <a:p>
-            <a:pPr lvl="1" marL="384120" indent="-181800">
+            <a:pPr lvl="1" marL="384120" indent="-181440">
               <a:lnSpc>
                 <a:spcPct val="90000"/>
               </a:lnSpc>
@@ -19294,7 +19376,7 @@
         <p:spPr>
           <a:xfrm>
             <a:off x="7425360" y="6459840"/>
-            <a:ext cx="982800" cy="363960"/>
+            <a:ext cx="982440" cy="363600"/>
           </a:xfrm>
           <a:prstGeom prst="rect">
             <a:avLst/>
@@ -19320,7 +19402,7 @@
                 <a:spcPct val="100000"/>
               </a:lnSpc>
             </a:pPr>
-            <a:fld id="{9B4425C2-6A1B-4575-B133-CE1D2CF21C0B}" type="slidenum">
+            <a:fld id="{DEEA36FE-8672-4E3E-934F-956851B734A7}" type="slidenum">
               <a:rPr b="0" lang="en-US" sz="1050" spc="-1" strike="noStrike">
                 <a:solidFill>
                   <a:srgbClr val="ffffff"/>
@@ -19349,7 +19431,7 @@
         <p:spPr>
           <a:xfrm>
             <a:off x="4419720" y="1981080"/>
-            <a:ext cx="4290840" cy="2018520"/>
+            <a:ext cx="4290480" cy="2018160"/>
           </a:xfrm>
           <a:prstGeom prst="rect">
             <a:avLst/>
@@ -19398,7 +19480,7 @@
         <p:spPr>
           <a:xfrm>
             <a:off x="822960" y="286560"/>
-            <a:ext cx="7542720" cy="1449720"/>
+            <a:ext cx="7542360" cy="1449360"/>
           </a:xfrm>
           <a:prstGeom prst="rect">
             <a:avLst/>
@@ -19489,7 +19571,7 @@
         <p:spPr>
           <a:xfrm>
             <a:off x="822960" y="1845720"/>
-            <a:ext cx="7542720" cy="4401720"/>
+            <a:ext cx="7542360" cy="4401360"/>
           </a:xfrm>
           <a:prstGeom prst="rect">
             <a:avLst/>
@@ -19510,7 +19592,7 @@
             <a:normAutofit fontScale="81000"/>
           </a:bodyPr>
           <a:p>
-            <a:pPr marL="91440" indent="-90360">
+            <a:pPr marL="91440" indent="-90000">
               <a:lnSpc>
                 <a:spcPct val="90000"/>
               </a:lnSpc>
@@ -19541,7 +19623,7 @@
             </a:endParaRPr>
           </a:p>
           <a:p>
-            <a:pPr lvl="1" marL="384120" indent="-181800">
+            <a:pPr lvl="1" marL="384120" indent="-181440">
               <a:lnSpc>
                 <a:spcPct val="90000"/>
               </a:lnSpc>
@@ -19582,7 +19664,7 @@
             </a:endParaRPr>
           </a:p>
           <a:p>
-            <a:pPr lvl="1" marL="384120" indent="-181800">
+            <a:pPr lvl="1" marL="384120" indent="-181440">
               <a:lnSpc>
                 <a:spcPct val="90000"/>
               </a:lnSpc>
@@ -19613,7 +19695,7 @@
             </a:endParaRPr>
           </a:p>
           <a:p>
-            <a:pPr lvl="1" marL="384120" indent="-181800">
+            <a:pPr lvl="1" marL="384120" indent="-181440">
               <a:lnSpc>
                 <a:spcPct val="90000"/>
               </a:lnSpc>
@@ -19660,7 +19742,7 @@
             </a:endParaRPr>
           </a:p>
           <a:p>
-            <a:pPr marL="91440" indent="-90360">
+            <a:pPr marL="91440" indent="-90000">
               <a:lnSpc>
                 <a:spcPct val="90000"/>
               </a:lnSpc>
@@ -19707,7 +19789,7 @@
             </a:endParaRPr>
           </a:p>
           <a:p>
-            <a:pPr marL="91440" indent="-90360">
+            <a:pPr marL="91440" indent="-90000">
               <a:lnSpc>
                 <a:spcPct val="90000"/>
               </a:lnSpc>
@@ -19754,7 +19836,7 @@
             </a:endParaRPr>
           </a:p>
           <a:p>
-            <a:pPr marL="91440" indent="-90360">
+            <a:pPr marL="91440" indent="-90000">
               <a:lnSpc>
                 <a:spcPct val="90000"/>
               </a:lnSpc>
@@ -20270,7 +20352,7 @@
         <p:spPr>
           <a:xfrm>
             <a:off x="822960" y="286560"/>
-            <a:ext cx="7542720" cy="1449720"/>
+            <a:ext cx="7542360" cy="1449360"/>
           </a:xfrm>
           <a:prstGeom prst="rect">
             <a:avLst/>
@@ -20321,7 +20403,7 @@
         <p:spPr>
           <a:xfrm>
             <a:off x="822960" y="1845720"/>
-            <a:ext cx="7542720" cy="4022280"/>
+            <a:ext cx="7542360" cy="4021920"/>
           </a:xfrm>
           <a:prstGeom prst="rect">
             <a:avLst/>
@@ -20342,7 +20424,7 @@
             <a:noAutofit/>
           </a:bodyPr>
           <a:p>
-            <a:pPr marL="91440" indent="-90360">
+            <a:pPr marL="91440" indent="-90000">
               <a:lnSpc>
                 <a:spcPct val="90000"/>
               </a:lnSpc>
@@ -20389,7 +20471,7 @@
             </a:endParaRPr>
           </a:p>
           <a:p>
-            <a:pPr marL="91440" indent="-90360">
+            <a:pPr marL="91440" indent="-90000">
               <a:lnSpc>
                 <a:spcPct val="90000"/>
               </a:lnSpc>
@@ -20436,7 +20518,7 @@
             </a:endParaRPr>
           </a:p>
           <a:p>
-            <a:pPr marL="91440" indent="-90360">
+            <a:pPr marL="91440" indent="-90000">
               <a:lnSpc>
                 <a:spcPct val="90000"/>
               </a:lnSpc>

</xml_diff>